<commit_message>
Re #422: Updated presentations, removed obsolete one
git-svn-id: https://subversion.assembla.com/svn/slicerrt/trunk/SlicerRt/doc@2892 25a7314f-c4c8-4314-9936-a25f8480a772
</commit_message>
<xml_diff>
--- a/overview/SlicerRtArchitecture.pptx
+++ b/overview/SlicerRtArchitecture.pptx
@@ -7,14 +7,14 @@
   <p:sldIdLst>
     <p:sldId id="256" r:id="rId2"/>
   </p:sldIdLst>
-  <p:sldSz cx="14630400" cy="10972800"/>
+  <p:sldSz cx="17281525" cy="12961938"/>
   <p:notesSz cx="6858000" cy="9144000"/>
   <p:defaultTextStyle>
     <a:defPPr>
       <a:defRPr lang="en-US"/>
     </a:defPPr>
-    <a:lvl1pPr marL="0" algn="l" defTabSz="1463040" rtl="0" eaLnBrk="1" latinLnBrk="0" hangingPunct="1">
-      <a:defRPr sz="2900" kern="1200">
+    <a:lvl1pPr marL="0" algn="l" defTabSz="1728143" rtl="0" eaLnBrk="1" latinLnBrk="0" hangingPunct="1">
+      <a:defRPr sz="3400" kern="1200">
         <a:solidFill>
           <a:schemeClr val="tx1"/>
         </a:solidFill>
@@ -23,8 +23,8 @@
         <a:cs typeface="+mn-cs"/>
       </a:defRPr>
     </a:lvl1pPr>
-    <a:lvl2pPr marL="731520" algn="l" defTabSz="1463040" rtl="0" eaLnBrk="1" latinLnBrk="0" hangingPunct="1">
-      <a:defRPr sz="2900" kern="1200">
+    <a:lvl2pPr marL="864071" algn="l" defTabSz="1728143" rtl="0" eaLnBrk="1" latinLnBrk="0" hangingPunct="1">
+      <a:defRPr sz="3400" kern="1200">
         <a:solidFill>
           <a:schemeClr val="tx1"/>
         </a:solidFill>
@@ -33,8 +33,8 @@
         <a:cs typeface="+mn-cs"/>
       </a:defRPr>
     </a:lvl2pPr>
-    <a:lvl3pPr marL="1463040" algn="l" defTabSz="1463040" rtl="0" eaLnBrk="1" latinLnBrk="0" hangingPunct="1">
-      <a:defRPr sz="2900" kern="1200">
+    <a:lvl3pPr marL="1728143" algn="l" defTabSz="1728143" rtl="0" eaLnBrk="1" latinLnBrk="0" hangingPunct="1">
+      <a:defRPr sz="3400" kern="1200">
         <a:solidFill>
           <a:schemeClr val="tx1"/>
         </a:solidFill>
@@ -43,8 +43,8 @@
         <a:cs typeface="+mn-cs"/>
       </a:defRPr>
     </a:lvl3pPr>
-    <a:lvl4pPr marL="2194560" algn="l" defTabSz="1463040" rtl="0" eaLnBrk="1" latinLnBrk="0" hangingPunct="1">
-      <a:defRPr sz="2900" kern="1200">
+    <a:lvl4pPr marL="2592214" algn="l" defTabSz="1728143" rtl="0" eaLnBrk="1" latinLnBrk="0" hangingPunct="1">
+      <a:defRPr sz="3400" kern="1200">
         <a:solidFill>
           <a:schemeClr val="tx1"/>
         </a:solidFill>
@@ -53,8 +53,8 @@
         <a:cs typeface="+mn-cs"/>
       </a:defRPr>
     </a:lvl4pPr>
-    <a:lvl5pPr marL="2926080" algn="l" defTabSz="1463040" rtl="0" eaLnBrk="1" latinLnBrk="0" hangingPunct="1">
-      <a:defRPr sz="2900" kern="1200">
+    <a:lvl5pPr marL="3456286" algn="l" defTabSz="1728143" rtl="0" eaLnBrk="1" latinLnBrk="0" hangingPunct="1">
+      <a:defRPr sz="3400" kern="1200">
         <a:solidFill>
           <a:schemeClr val="tx1"/>
         </a:solidFill>
@@ -63,8 +63,8 @@
         <a:cs typeface="+mn-cs"/>
       </a:defRPr>
     </a:lvl5pPr>
-    <a:lvl6pPr marL="3657600" algn="l" defTabSz="1463040" rtl="0" eaLnBrk="1" latinLnBrk="0" hangingPunct="1">
-      <a:defRPr sz="2900" kern="1200">
+    <a:lvl6pPr marL="4320357" algn="l" defTabSz="1728143" rtl="0" eaLnBrk="1" latinLnBrk="0" hangingPunct="1">
+      <a:defRPr sz="3400" kern="1200">
         <a:solidFill>
           <a:schemeClr val="tx1"/>
         </a:solidFill>
@@ -73,8 +73,8 @@
         <a:cs typeface="+mn-cs"/>
       </a:defRPr>
     </a:lvl6pPr>
-    <a:lvl7pPr marL="4389120" algn="l" defTabSz="1463040" rtl="0" eaLnBrk="1" latinLnBrk="0" hangingPunct="1">
-      <a:defRPr sz="2900" kern="1200">
+    <a:lvl7pPr marL="5184429" algn="l" defTabSz="1728143" rtl="0" eaLnBrk="1" latinLnBrk="0" hangingPunct="1">
+      <a:defRPr sz="3400" kern="1200">
         <a:solidFill>
           <a:schemeClr val="tx1"/>
         </a:solidFill>
@@ -83,8 +83,8 @@
         <a:cs typeface="+mn-cs"/>
       </a:defRPr>
     </a:lvl7pPr>
-    <a:lvl8pPr marL="5120640" algn="l" defTabSz="1463040" rtl="0" eaLnBrk="1" latinLnBrk="0" hangingPunct="1">
-      <a:defRPr sz="2900" kern="1200">
+    <a:lvl8pPr marL="6048500" algn="l" defTabSz="1728143" rtl="0" eaLnBrk="1" latinLnBrk="0" hangingPunct="1">
+      <a:defRPr sz="3400" kern="1200">
         <a:solidFill>
           <a:schemeClr val="tx1"/>
         </a:solidFill>
@@ -93,8 +93,8 @@
         <a:cs typeface="+mn-cs"/>
       </a:defRPr>
     </a:lvl8pPr>
-    <a:lvl9pPr marL="5852160" algn="l" defTabSz="1463040" rtl="0" eaLnBrk="1" latinLnBrk="0" hangingPunct="1">
-      <a:defRPr sz="2900" kern="1200">
+    <a:lvl9pPr marL="6912571" algn="l" defTabSz="1728143" rtl="0" eaLnBrk="1" latinLnBrk="0" hangingPunct="1">
+      <a:defRPr sz="3400" kern="1200">
         <a:solidFill>
           <a:schemeClr val="tx1"/>
         </a:solidFill>
@@ -104,6 +104,22 @@
       </a:defRPr>
     </a:lvl9pPr>
   </p:defaultTextStyle>
+  <p:extLst>
+    <p:ext uri="{EFAFB233-063F-42B5-8137-9DF3F51BA10A}">
+      <p15:sldGuideLst xmlns:p15="http://schemas.microsoft.com/office/powerpoint/2012/main" xmlns="">
+        <p15:guide id="1" orient="horz" pos="4083">
+          <p15:clr>
+            <a:srgbClr val="A4A3A4"/>
+          </p15:clr>
+        </p15:guide>
+        <p15:guide id="2" pos="5443">
+          <p15:clr>
+            <a:srgbClr val="A4A3A4"/>
+          </p15:clr>
+        </p15:guide>
+      </p15:sldGuideLst>
+    </p:ext>
+  </p:extLst>
 </p:presentation>
 </file>
 
@@ -136,8 +152,8 @@
         </p:nvSpPr>
         <p:spPr>
           <a:xfrm>
-            <a:off x="1097280" y="3408682"/>
-            <a:ext cx="12435840" cy="2352040"/>
+            <a:off x="1296115" y="4026605"/>
+            <a:ext cx="14689296" cy="2778415"/>
           </a:xfrm>
         </p:spPr>
         <p:txBody>
@@ -164,8 +180,8 @@
         </p:nvSpPr>
         <p:spPr>
           <a:xfrm>
-            <a:off x="2194560" y="6217920"/>
-            <a:ext cx="10241280" cy="2804160"/>
+            <a:off x="2592229" y="7345098"/>
+            <a:ext cx="12097068" cy="3312495"/>
           </a:xfrm>
         </p:spPr>
         <p:txBody>
@@ -181,7 +197,7 @@
                 </a:solidFill>
               </a:defRPr>
             </a:lvl1pPr>
-            <a:lvl2pPr marL="731520" indent="0" algn="ctr">
+            <a:lvl2pPr marL="864071" indent="0" algn="ctr">
               <a:buNone/>
               <a:defRPr>
                 <a:solidFill>
@@ -191,7 +207,7 @@
                 </a:solidFill>
               </a:defRPr>
             </a:lvl2pPr>
-            <a:lvl3pPr marL="1463040" indent="0" algn="ctr">
+            <a:lvl3pPr marL="1728143" indent="0" algn="ctr">
               <a:buNone/>
               <a:defRPr>
                 <a:solidFill>
@@ -201,7 +217,7 @@
                 </a:solidFill>
               </a:defRPr>
             </a:lvl3pPr>
-            <a:lvl4pPr marL="2194560" indent="0" algn="ctr">
+            <a:lvl4pPr marL="2592214" indent="0" algn="ctr">
               <a:buNone/>
               <a:defRPr>
                 <a:solidFill>
@@ -211,7 +227,7 @@
                 </a:solidFill>
               </a:defRPr>
             </a:lvl4pPr>
-            <a:lvl5pPr marL="2926080" indent="0" algn="ctr">
+            <a:lvl5pPr marL="3456286" indent="0" algn="ctr">
               <a:buNone/>
               <a:defRPr>
                 <a:solidFill>
@@ -221,7 +237,7 @@
                 </a:solidFill>
               </a:defRPr>
             </a:lvl5pPr>
-            <a:lvl6pPr marL="3657600" indent="0" algn="ctr">
+            <a:lvl6pPr marL="4320357" indent="0" algn="ctr">
               <a:buNone/>
               <a:defRPr>
                 <a:solidFill>
@@ -231,7 +247,7 @@
                 </a:solidFill>
               </a:defRPr>
             </a:lvl6pPr>
-            <a:lvl7pPr marL="4389120" indent="0" algn="ctr">
+            <a:lvl7pPr marL="5184429" indent="0" algn="ctr">
               <a:buNone/>
               <a:defRPr>
                 <a:solidFill>
@@ -241,7 +257,7 @@
                 </a:solidFill>
               </a:defRPr>
             </a:lvl7pPr>
-            <a:lvl8pPr marL="5120640" indent="0" algn="ctr">
+            <a:lvl8pPr marL="6048500" indent="0" algn="ctr">
               <a:buNone/>
               <a:defRPr>
                 <a:solidFill>
@@ -251,7 +267,7 @@
                 </a:solidFill>
               </a:defRPr>
             </a:lvl8pPr>
-            <a:lvl9pPr marL="5852160" indent="0" algn="ctr">
+            <a:lvl9pPr marL="6912571" indent="0" algn="ctr">
               <a:buNone/>
               <a:defRPr>
                 <a:solidFill>
@@ -288,7 +304,7 @@
           <a:p>
             <a:fld id="{038C4A76-0DD3-43B8-8465-4DCB4834B4DF}" type="datetimeFigureOut">
               <a:rPr lang="en-US" smtClean="0"/>
-              <a:t>9/26/2013</a:t>
+              <a:t>16-01-04</a:t>
             </a:fld>
             <a:endParaRPr lang="en-US"/>
           </a:p>
@@ -458,7 +474,7 @@
           <a:p>
             <a:fld id="{038C4A76-0DD3-43B8-8465-4DCB4834B4DF}" type="datetimeFigureOut">
               <a:rPr lang="en-US" smtClean="0"/>
-              <a:t>9/26/2013</a:t>
+              <a:t>16-01-04</a:t>
             </a:fld>
             <a:endParaRPr lang="en-US"/>
           </a:p>
@@ -548,8 +564,8 @@
         </p:nvSpPr>
         <p:spPr>
           <a:xfrm>
-            <a:off x="10607040" y="439423"/>
-            <a:ext cx="3291840" cy="9362440"/>
+            <a:off x="12529106" y="519081"/>
+            <a:ext cx="3888343" cy="11059654"/>
           </a:xfrm>
         </p:spPr>
         <p:txBody>
@@ -576,8 +592,8 @@
         </p:nvSpPr>
         <p:spPr>
           <a:xfrm>
-            <a:off x="731520" y="439423"/>
-            <a:ext cx="9631680" cy="9362440"/>
+            <a:off x="864076" y="519081"/>
+            <a:ext cx="11377004" cy="11059654"/>
           </a:xfrm>
         </p:spPr>
         <p:txBody>
@@ -638,7 +654,7 @@
           <a:p>
             <a:fld id="{038C4A76-0DD3-43B8-8465-4DCB4834B4DF}" type="datetimeFigureOut">
               <a:rPr lang="en-US" smtClean="0"/>
-              <a:t>9/26/2013</a:t>
+              <a:t>16-01-04</a:t>
             </a:fld>
             <a:endParaRPr lang="en-US"/>
           </a:p>
@@ -808,7 +824,7 @@
           <a:p>
             <a:fld id="{038C4A76-0DD3-43B8-8465-4DCB4834B4DF}" type="datetimeFigureOut">
               <a:rPr lang="en-US" smtClean="0"/>
-              <a:t>9/26/2013</a:t>
+              <a:t>16-01-04</a:t>
             </a:fld>
             <a:endParaRPr lang="en-US"/>
           </a:p>
@@ -898,15 +914,15 @@
         </p:nvSpPr>
         <p:spPr>
           <a:xfrm>
-            <a:off x="1155701" y="7051042"/>
-            <a:ext cx="12435840" cy="2179320"/>
+            <a:off x="1365122" y="8329248"/>
+            <a:ext cx="14689296" cy="2574385"/>
           </a:xfrm>
         </p:spPr>
         <p:txBody>
           <a:bodyPr anchor="t"/>
           <a:lstStyle>
             <a:lvl1pPr algn="l">
-              <a:defRPr sz="6400" b="1" cap="all"/>
+              <a:defRPr sz="7600" b="1" cap="all"/>
             </a:lvl1pPr>
           </a:lstStyle>
           <a:p>
@@ -930,8 +946,8 @@
         </p:nvSpPr>
         <p:spPr>
           <a:xfrm>
-            <a:off x="1155701" y="4650742"/>
-            <a:ext cx="12435840" cy="2400299"/>
+            <a:off x="1365122" y="5493824"/>
+            <a:ext cx="14689296" cy="2835423"/>
           </a:xfrm>
         </p:spPr>
         <p:txBody>
@@ -939,7 +955,7 @@
           <a:lstStyle>
             <a:lvl1pPr marL="0" indent="0">
               <a:buNone/>
-              <a:defRPr sz="3200">
+              <a:defRPr sz="3800">
                 <a:solidFill>
                   <a:schemeClr val="tx1">
                     <a:tint val="75000"/>
@@ -947,9 +963,9 @@
                 </a:solidFill>
               </a:defRPr>
             </a:lvl1pPr>
-            <a:lvl2pPr marL="731520" indent="0">
-              <a:buNone/>
-              <a:defRPr sz="2900">
+            <a:lvl2pPr marL="864071" indent="0">
+              <a:buNone/>
+              <a:defRPr sz="3400">
                 <a:solidFill>
                   <a:schemeClr val="tx1">
                     <a:tint val="75000"/>
@@ -957,7 +973,17 @@
                 </a:solidFill>
               </a:defRPr>
             </a:lvl2pPr>
-            <a:lvl3pPr marL="1463040" indent="0">
+            <a:lvl3pPr marL="1728143" indent="0">
+              <a:buNone/>
+              <a:defRPr sz="3100">
+                <a:solidFill>
+                  <a:schemeClr val="tx1">
+                    <a:tint val="75000"/>
+                  </a:schemeClr>
+                </a:solidFill>
+              </a:defRPr>
+            </a:lvl3pPr>
+            <a:lvl4pPr marL="2592214" indent="0">
               <a:buNone/>
               <a:defRPr sz="2600">
                 <a:solidFill>
@@ -966,20 +992,10 @@
                   </a:schemeClr>
                 </a:solidFill>
               </a:defRPr>
-            </a:lvl3pPr>
-            <a:lvl4pPr marL="2194560" indent="0">
-              <a:buNone/>
-              <a:defRPr sz="2200">
-                <a:solidFill>
-                  <a:schemeClr val="tx1">
-                    <a:tint val="75000"/>
-                  </a:schemeClr>
-                </a:solidFill>
-              </a:defRPr>
             </a:lvl4pPr>
-            <a:lvl5pPr marL="2926080" indent="0">
-              <a:buNone/>
-              <a:defRPr sz="2200">
+            <a:lvl5pPr marL="3456286" indent="0">
+              <a:buNone/>
+              <a:defRPr sz="2600">
                 <a:solidFill>
                   <a:schemeClr val="tx1">
                     <a:tint val="75000"/>
@@ -987,9 +1003,9 @@
                 </a:solidFill>
               </a:defRPr>
             </a:lvl5pPr>
-            <a:lvl6pPr marL="3657600" indent="0">
-              <a:buNone/>
-              <a:defRPr sz="2200">
+            <a:lvl6pPr marL="4320357" indent="0">
+              <a:buNone/>
+              <a:defRPr sz="2600">
                 <a:solidFill>
                   <a:schemeClr val="tx1">
                     <a:tint val="75000"/>
@@ -997,9 +1013,9 @@
                 </a:solidFill>
               </a:defRPr>
             </a:lvl6pPr>
-            <a:lvl7pPr marL="4389120" indent="0">
-              <a:buNone/>
-              <a:defRPr sz="2200">
+            <a:lvl7pPr marL="5184429" indent="0">
+              <a:buNone/>
+              <a:defRPr sz="2600">
                 <a:solidFill>
                   <a:schemeClr val="tx1">
                     <a:tint val="75000"/>
@@ -1007,9 +1023,9 @@
                 </a:solidFill>
               </a:defRPr>
             </a:lvl7pPr>
-            <a:lvl8pPr marL="5120640" indent="0">
-              <a:buNone/>
-              <a:defRPr sz="2200">
+            <a:lvl8pPr marL="6048500" indent="0">
+              <a:buNone/>
+              <a:defRPr sz="2600">
                 <a:solidFill>
                   <a:schemeClr val="tx1">
                     <a:tint val="75000"/>
@@ -1017,9 +1033,9 @@
                 </a:solidFill>
               </a:defRPr>
             </a:lvl8pPr>
-            <a:lvl9pPr marL="5852160" indent="0">
-              <a:buNone/>
-              <a:defRPr sz="2200">
+            <a:lvl9pPr marL="6912571" indent="0">
+              <a:buNone/>
+              <a:defRPr sz="2600">
                 <a:solidFill>
                   <a:schemeClr val="tx1">
                     <a:tint val="75000"/>
@@ -1054,7 +1070,7 @@
           <a:p>
             <a:fld id="{038C4A76-0DD3-43B8-8465-4DCB4834B4DF}" type="datetimeFigureOut">
               <a:rPr lang="en-US" smtClean="0"/>
-              <a:t>9/26/2013</a:t>
+              <a:t>16-01-04</a:t>
             </a:fld>
             <a:endParaRPr lang="en-US"/>
           </a:p>
@@ -1167,39 +1183,39 @@
         </p:nvSpPr>
         <p:spPr>
           <a:xfrm>
-            <a:off x="731520" y="2560322"/>
-            <a:ext cx="6461760" cy="7241541"/>
+            <a:off x="864076" y="3024455"/>
+            <a:ext cx="7632674" cy="8554280"/>
           </a:xfrm>
         </p:spPr>
         <p:txBody>
           <a:bodyPr/>
           <a:lstStyle>
             <a:lvl1pPr>
-              <a:defRPr sz="4500"/>
+              <a:defRPr sz="5300"/>
             </a:lvl1pPr>
             <a:lvl2pPr>
-              <a:defRPr sz="3800"/>
+              <a:defRPr sz="4500"/>
             </a:lvl2pPr>
             <a:lvl3pPr>
-              <a:defRPr sz="3200"/>
+              <a:defRPr sz="3800"/>
             </a:lvl3pPr>
             <a:lvl4pPr>
-              <a:defRPr sz="2900"/>
+              <a:defRPr sz="3400"/>
             </a:lvl4pPr>
             <a:lvl5pPr>
-              <a:defRPr sz="2900"/>
+              <a:defRPr sz="3400"/>
             </a:lvl5pPr>
             <a:lvl6pPr>
-              <a:defRPr sz="2900"/>
+              <a:defRPr sz="3400"/>
             </a:lvl6pPr>
             <a:lvl7pPr>
-              <a:defRPr sz="2900"/>
+              <a:defRPr sz="3400"/>
             </a:lvl7pPr>
             <a:lvl8pPr>
-              <a:defRPr sz="2900"/>
+              <a:defRPr sz="3400"/>
             </a:lvl8pPr>
             <a:lvl9pPr>
-              <a:defRPr sz="2900"/>
+              <a:defRPr sz="3400"/>
             </a:lvl9pPr>
           </a:lstStyle>
           <a:p>
@@ -1252,39 +1268,39 @@
         </p:nvSpPr>
         <p:spPr>
           <a:xfrm>
-            <a:off x="7437120" y="2560322"/>
-            <a:ext cx="6461760" cy="7241541"/>
+            <a:off x="8784775" y="3024455"/>
+            <a:ext cx="7632674" cy="8554280"/>
           </a:xfrm>
         </p:spPr>
         <p:txBody>
           <a:bodyPr/>
           <a:lstStyle>
             <a:lvl1pPr>
-              <a:defRPr sz="4500"/>
+              <a:defRPr sz="5300"/>
             </a:lvl1pPr>
             <a:lvl2pPr>
-              <a:defRPr sz="3800"/>
+              <a:defRPr sz="4500"/>
             </a:lvl2pPr>
             <a:lvl3pPr>
-              <a:defRPr sz="3200"/>
+              <a:defRPr sz="3800"/>
             </a:lvl3pPr>
             <a:lvl4pPr>
-              <a:defRPr sz="2900"/>
+              <a:defRPr sz="3400"/>
             </a:lvl4pPr>
             <a:lvl5pPr>
-              <a:defRPr sz="2900"/>
+              <a:defRPr sz="3400"/>
             </a:lvl5pPr>
             <a:lvl6pPr>
-              <a:defRPr sz="2900"/>
+              <a:defRPr sz="3400"/>
             </a:lvl6pPr>
             <a:lvl7pPr>
-              <a:defRPr sz="2900"/>
+              <a:defRPr sz="3400"/>
             </a:lvl7pPr>
             <a:lvl8pPr>
-              <a:defRPr sz="2900"/>
+              <a:defRPr sz="3400"/>
             </a:lvl8pPr>
             <a:lvl9pPr>
-              <a:defRPr sz="2900"/>
+              <a:defRPr sz="3400"/>
             </a:lvl9pPr>
           </a:lstStyle>
           <a:p>
@@ -1342,7 +1358,7 @@
           <a:p>
             <a:fld id="{038C4A76-0DD3-43B8-8465-4DCB4834B4DF}" type="datetimeFigureOut">
               <a:rPr lang="en-US" smtClean="0"/>
-              <a:t>9/26/2013</a:t>
+              <a:t>16-01-04</a:t>
             </a:fld>
             <a:endParaRPr lang="en-US"/>
           </a:p>
@@ -1459,8 +1475,8 @@
         </p:nvSpPr>
         <p:spPr>
           <a:xfrm>
-            <a:off x="731520" y="2456181"/>
-            <a:ext cx="6464301" cy="1023619"/>
+            <a:off x="864077" y="2901435"/>
+            <a:ext cx="7635675" cy="1209180"/>
           </a:xfrm>
         </p:spPr>
         <p:txBody>
@@ -1468,39 +1484,39 @@
           <a:lstStyle>
             <a:lvl1pPr marL="0" indent="0">
               <a:buNone/>
+              <a:defRPr sz="4500" b="1"/>
+            </a:lvl1pPr>
+            <a:lvl2pPr marL="864071" indent="0">
+              <a:buNone/>
               <a:defRPr sz="3800" b="1"/>
-            </a:lvl1pPr>
-            <a:lvl2pPr marL="731520" indent="0">
-              <a:buNone/>
-              <a:defRPr sz="3200" b="1"/>
             </a:lvl2pPr>
-            <a:lvl3pPr marL="1463040" indent="0">
-              <a:buNone/>
-              <a:defRPr sz="2900" b="1"/>
+            <a:lvl3pPr marL="1728143" indent="0">
+              <a:buNone/>
+              <a:defRPr sz="3400" b="1"/>
             </a:lvl3pPr>
-            <a:lvl4pPr marL="2194560" indent="0">
-              <a:buNone/>
-              <a:defRPr sz="2600" b="1"/>
+            <a:lvl4pPr marL="2592214" indent="0">
+              <a:buNone/>
+              <a:defRPr sz="3100" b="1"/>
             </a:lvl4pPr>
-            <a:lvl5pPr marL="2926080" indent="0">
-              <a:buNone/>
-              <a:defRPr sz="2600" b="1"/>
+            <a:lvl5pPr marL="3456286" indent="0">
+              <a:buNone/>
+              <a:defRPr sz="3100" b="1"/>
             </a:lvl5pPr>
-            <a:lvl6pPr marL="3657600" indent="0">
-              <a:buNone/>
-              <a:defRPr sz="2600" b="1"/>
+            <a:lvl6pPr marL="4320357" indent="0">
+              <a:buNone/>
+              <a:defRPr sz="3100" b="1"/>
             </a:lvl6pPr>
-            <a:lvl7pPr marL="4389120" indent="0">
-              <a:buNone/>
-              <a:defRPr sz="2600" b="1"/>
+            <a:lvl7pPr marL="5184429" indent="0">
+              <a:buNone/>
+              <a:defRPr sz="3100" b="1"/>
             </a:lvl7pPr>
-            <a:lvl8pPr marL="5120640" indent="0">
-              <a:buNone/>
-              <a:defRPr sz="2600" b="1"/>
+            <a:lvl8pPr marL="6048500" indent="0">
+              <a:buNone/>
+              <a:defRPr sz="3100" b="1"/>
             </a:lvl8pPr>
-            <a:lvl9pPr marL="5852160" indent="0">
-              <a:buNone/>
-              <a:defRPr sz="2600" b="1"/>
+            <a:lvl9pPr marL="6912571" indent="0">
+              <a:buNone/>
+              <a:defRPr sz="3100" b="1"/>
             </a:lvl9pPr>
           </a:lstStyle>
           <a:p>
@@ -1524,39 +1540,39 @@
         </p:nvSpPr>
         <p:spPr>
           <a:xfrm>
-            <a:off x="731520" y="3479800"/>
-            <a:ext cx="6464301" cy="6322061"/>
+            <a:off x="864077" y="4110615"/>
+            <a:ext cx="7635675" cy="7468118"/>
           </a:xfrm>
         </p:spPr>
         <p:txBody>
           <a:bodyPr/>
           <a:lstStyle>
             <a:lvl1pPr>
-              <a:defRPr sz="3800"/>
+              <a:defRPr sz="4500"/>
             </a:lvl1pPr>
             <a:lvl2pPr>
-              <a:defRPr sz="3200"/>
+              <a:defRPr sz="3800"/>
             </a:lvl2pPr>
             <a:lvl3pPr>
-              <a:defRPr sz="2900"/>
+              <a:defRPr sz="3400"/>
             </a:lvl3pPr>
             <a:lvl4pPr>
-              <a:defRPr sz="2600"/>
+              <a:defRPr sz="3100"/>
             </a:lvl4pPr>
             <a:lvl5pPr>
-              <a:defRPr sz="2600"/>
+              <a:defRPr sz="3100"/>
             </a:lvl5pPr>
             <a:lvl6pPr>
-              <a:defRPr sz="2600"/>
+              <a:defRPr sz="3100"/>
             </a:lvl6pPr>
             <a:lvl7pPr>
-              <a:defRPr sz="2600"/>
+              <a:defRPr sz="3100"/>
             </a:lvl7pPr>
             <a:lvl8pPr>
-              <a:defRPr sz="2600"/>
+              <a:defRPr sz="3100"/>
             </a:lvl8pPr>
             <a:lvl9pPr>
-              <a:defRPr sz="2600"/>
+              <a:defRPr sz="3100"/>
             </a:lvl9pPr>
           </a:lstStyle>
           <a:p>
@@ -1609,8 +1625,8 @@
         </p:nvSpPr>
         <p:spPr>
           <a:xfrm>
-            <a:off x="7432042" y="2456181"/>
-            <a:ext cx="6466840" cy="1023619"/>
+            <a:off x="8778777" y="2901435"/>
+            <a:ext cx="7638674" cy="1209180"/>
           </a:xfrm>
         </p:spPr>
         <p:txBody>
@@ -1618,39 +1634,39 @@
           <a:lstStyle>
             <a:lvl1pPr marL="0" indent="0">
               <a:buNone/>
+              <a:defRPr sz="4500" b="1"/>
+            </a:lvl1pPr>
+            <a:lvl2pPr marL="864071" indent="0">
+              <a:buNone/>
               <a:defRPr sz="3800" b="1"/>
-            </a:lvl1pPr>
-            <a:lvl2pPr marL="731520" indent="0">
-              <a:buNone/>
-              <a:defRPr sz="3200" b="1"/>
             </a:lvl2pPr>
-            <a:lvl3pPr marL="1463040" indent="0">
-              <a:buNone/>
-              <a:defRPr sz="2900" b="1"/>
+            <a:lvl3pPr marL="1728143" indent="0">
+              <a:buNone/>
+              <a:defRPr sz="3400" b="1"/>
             </a:lvl3pPr>
-            <a:lvl4pPr marL="2194560" indent="0">
-              <a:buNone/>
-              <a:defRPr sz="2600" b="1"/>
+            <a:lvl4pPr marL="2592214" indent="0">
+              <a:buNone/>
+              <a:defRPr sz="3100" b="1"/>
             </a:lvl4pPr>
-            <a:lvl5pPr marL="2926080" indent="0">
-              <a:buNone/>
-              <a:defRPr sz="2600" b="1"/>
+            <a:lvl5pPr marL="3456286" indent="0">
+              <a:buNone/>
+              <a:defRPr sz="3100" b="1"/>
             </a:lvl5pPr>
-            <a:lvl6pPr marL="3657600" indent="0">
-              <a:buNone/>
-              <a:defRPr sz="2600" b="1"/>
+            <a:lvl6pPr marL="4320357" indent="0">
+              <a:buNone/>
+              <a:defRPr sz="3100" b="1"/>
             </a:lvl6pPr>
-            <a:lvl7pPr marL="4389120" indent="0">
-              <a:buNone/>
-              <a:defRPr sz="2600" b="1"/>
+            <a:lvl7pPr marL="5184429" indent="0">
+              <a:buNone/>
+              <a:defRPr sz="3100" b="1"/>
             </a:lvl7pPr>
-            <a:lvl8pPr marL="5120640" indent="0">
-              <a:buNone/>
-              <a:defRPr sz="2600" b="1"/>
+            <a:lvl8pPr marL="6048500" indent="0">
+              <a:buNone/>
+              <a:defRPr sz="3100" b="1"/>
             </a:lvl8pPr>
-            <a:lvl9pPr marL="5852160" indent="0">
-              <a:buNone/>
-              <a:defRPr sz="2600" b="1"/>
+            <a:lvl9pPr marL="6912571" indent="0">
+              <a:buNone/>
+              <a:defRPr sz="3100" b="1"/>
             </a:lvl9pPr>
           </a:lstStyle>
           <a:p>
@@ -1674,39 +1690,39 @@
         </p:nvSpPr>
         <p:spPr>
           <a:xfrm>
-            <a:off x="7432042" y="3479800"/>
-            <a:ext cx="6466840" cy="6322061"/>
+            <a:off x="8778777" y="4110615"/>
+            <a:ext cx="7638674" cy="7468118"/>
           </a:xfrm>
         </p:spPr>
         <p:txBody>
           <a:bodyPr/>
           <a:lstStyle>
             <a:lvl1pPr>
-              <a:defRPr sz="3800"/>
+              <a:defRPr sz="4500"/>
             </a:lvl1pPr>
             <a:lvl2pPr>
-              <a:defRPr sz="3200"/>
+              <a:defRPr sz="3800"/>
             </a:lvl2pPr>
             <a:lvl3pPr>
-              <a:defRPr sz="2900"/>
+              <a:defRPr sz="3400"/>
             </a:lvl3pPr>
             <a:lvl4pPr>
-              <a:defRPr sz="2600"/>
+              <a:defRPr sz="3100"/>
             </a:lvl4pPr>
             <a:lvl5pPr>
-              <a:defRPr sz="2600"/>
+              <a:defRPr sz="3100"/>
             </a:lvl5pPr>
             <a:lvl6pPr>
-              <a:defRPr sz="2600"/>
+              <a:defRPr sz="3100"/>
             </a:lvl6pPr>
             <a:lvl7pPr>
-              <a:defRPr sz="2600"/>
+              <a:defRPr sz="3100"/>
             </a:lvl7pPr>
             <a:lvl8pPr>
-              <a:defRPr sz="2600"/>
+              <a:defRPr sz="3100"/>
             </a:lvl8pPr>
             <a:lvl9pPr>
-              <a:defRPr sz="2600"/>
+              <a:defRPr sz="3100"/>
             </a:lvl9pPr>
           </a:lstStyle>
           <a:p>
@@ -1764,7 +1780,7 @@
           <a:p>
             <a:fld id="{038C4A76-0DD3-43B8-8465-4DCB4834B4DF}" type="datetimeFigureOut">
               <a:rPr lang="en-US" smtClean="0"/>
-              <a:t>9/26/2013</a:t>
+              <a:t>16-01-04</a:t>
             </a:fld>
             <a:endParaRPr lang="en-US"/>
           </a:p>
@@ -1882,7 +1898,7 @@
           <a:p>
             <a:fld id="{038C4A76-0DD3-43B8-8465-4DCB4834B4DF}" type="datetimeFigureOut">
               <a:rPr lang="en-US" smtClean="0"/>
-              <a:t>9/26/2013</a:t>
+              <a:t>16-01-04</a:t>
             </a:fld>
             <a:endParaRPr lang="en-US"/>
           </a:p>
@@ -1977,7 +1993,7 @@
           <a:p>
             <a:fld id="{038C4A76-0DD3-43B8-8465-4DCB4834B4DF}" type="datetimeFigureOut">
               <a:rPr lang="en-US" smtClean="0"/>
-              <a:t>9/26/2013</a:t>
+              <a:t>16-01-04</a:t>
             </a:fld>
             <a:endParaRPr lang="en-US"/>
           </a:p>
@@ -2067,15 +2083,15 @@
         </p:nvSpPr>
         <p:spPr>
           <a:xfrm>
-            <a:off x="731522" y="436880"/>
-            <a:ext cx="4813301" cy="1859280"/>
+            <a:off x="864079" y="516077"/>
+            <a:ext cx="5685503" cy="2196328"/>
           </a:xfrm>
         </p:spPr>
         <p:txBody>
           <a:bodyPr anchor="b"/>
           <a:lstStyle>
             <a:lvl1pPr algn="l">
-              <a:defRPr sz="3200" b="1"/>
+              <a:defRPr sz="3800" b="1"/>
             </a:lvl1pPr>
           </a:lstStyle>
           <a:p>
@@ -2099,39 +2115,39 @@
         </p:nvSpPr>
         <p:spPr>
           <a:xfrm>
-            <a:off x="5720080" y="436882"/>
-            <a:ext cx="8178800" cy="9364981"/>
+            <a:off x="6756596" y="516080"/>
+            <a:ext cx="9660853" cy="11062655"/>
           </a:xfrm>
         </p:spPr>
         <p:txBody>
           <a:bodyPr/>
           <a:lstStyle>
             <a:lvl1pPr>
-              <a:defRPr sz="5100"/>
+              <a:defRPr sz="6000"/>
             </a:lvl1pPr>
             <a:lvl2pPr>
-              <a:defRPr sz="4500"/>
+              <a:defRPr sz="5300"/>
             </a:lvl2pPr>
             <a:lvl3pPr>
-              <a:defRPr sz="3800"/>
+              <a:defRPr sz="4500"/>
             </a:lvl3pPr>
             <a:lvl4pPr>
-              <a:defRPr sz="3200"/>
+              <a:defRPr sz="3800"/>
             </a:lvl4pPr>
             <a:lvl5pPr>
-              <a:defRPr sz="3200"/>
+              <a:defRPr sz="3800"/>
             </a:lvl5pPr>
             <a:lvl6pPr>
-              <a:defRPr sz="3200"/>
+              <a:defRPr sz="3800"/>
             </a:lvl6pPr>
             <a:lvl7pPr>
-              <a:defRPr sz="3200"/>
+              <a:defRPr sz="3800"/>
             </a:lvl7pPr>
             <a:lvl8pPr>
-              <a:defRPr sz="3200"/>
+              <a:defRPr sz="3800"/>
             </a:lvl8pPr>
             <a:lvl9pPr>
-              <a:defRPr sz="3200"/>
+              <a:defRPr sz="3800"/>
             </a:lvl9pPr>
           </a:lstStyle>
           <a:p>
@@ -2184,8 +2200,8 @@
         </p:nvSpPr>
         <p:spPr>
           <a:xfrm>
-            <a:off x="731522" y="2296162"/>
-            <a:ext cx="4813301" cy="7505701"/>
+            <a:off x="864079" y="2712408"/>
+            <a:ext cx="5685503" cy="8866327"/>
           </a:xfrm>
         </p:spPr>
         <p:txBody>
@@ -2193,39 +2209,39 @@
           <a:lstStyle>
             <a:lvl1pPr marL="0" indent="0">
               <a:buNone/>
+              <a:defRPr sz="2600"/>
+            </a:lvl1pPr>
+            <a:lvl2pPr marL="864071" indent="0">
+              <a:buNone/>
               <a:defRPr sz="2200"/>
-            </a:lvl1pPr>
-            <a:lvl2pPr marL="731520" indent="0">
+            </a:lvl2pPr>
+            <a:lvl3pPr marL="1728143" indent="0">
               <a:buNone/>
               <a:defRPr sz="1900"/>
-            </a:lvl2pPr>
-            <a:lvl3pPr marL="1463040" indent="0">
-              <a:buNone/>
-              <a:defRPr sz="1600"/>
             </a:lvl3pPr>
-            <a:lvl4pPr marL="2194560" indent="0">
-              <a:buNone/>
-              <a:defRPr sz="1400"/>
+            <a:lvl4pPr marL="2592214" indent="0">
+              <a:buNone/>
+              <a:defRPr sz="1700"/>
             </a:lvl4pPr>
-            <a:lvl5pPr marL="2926080" indent="0">
-              <a:buNone/>
-              <a:defRPr sz="1400"/>
+            <a:lvl5pPr marL="3456286" indent="0">
+              <a:buNone/>
+              <a:defRPr sz="1700"/>
             </a:lvl5pPr>
-            <a:lvl6pPr marL="3657600" indent="0">
-              <a:buNone/>
-              <a:defRPr sz="1400"/>
+            <a:lvl6pPr marL="4320357" indent="0">
+              <a:buNone/>
+              <a:defRPr sz="1700"/>
             </a:lvl6pPr>
-            <a:lvl7pPr marL="4389120" indent="0">
-              <a:buNone/>
-              <a:defRPr sz="1400"/>
+            <a:lvl7pPr marL="5184429" indent="0">
+              <a:buNone/>
+              <a:defRPr sz="1700"/>
             </a:lvl7pPr>
-            <a:lvl8pPr marL="5120640" indent="0">
-              <a:buNone/>
-              <a:defRPr sz="1400"/>
+            <a:lvl8pPr marL="6048500" indent="0">
+              <a:buNone/>
+              <a:defRPr sz="1700"/>
             </a:lvl8pPr>
-            <a:lvl9pPr marL="5852160" indent="0">
-              <a:buNone/>
-              <a:defRPr sz="1400"/>
+            <a:lvl9pPr marL="6912571" indent="0">
+              <a:buNone/>
+              <a:defRPr sz="1700"/>
             </a:lvl9pPr>
           </a:lstStyle>
           <a:p>
@@ -2254,7 +2270,7 @@
           <a:p>
             <a:fld id="{038C4A76-0DD3-43B8-8465-4DCB4834B4DF}" type="datetimeFigureOut">
               <a:rPr lang="en-US" smtClean="0"/>
-              <a:t>9/26/2013</a:t>
+              <a:t>16-01-04</a:t>
             </a:fld>
             <a:endParaRPr lang="en-US"/>
           </a:p>
@@ -2344,15 +2360,15 @@
         </p:nvSpPr>
         <p:spPr>
           <a:xfrm>
-            <a:off x="2867661" y="7680960"/>
-            <a:ext cx="8778240" cy="906781"/>
+            <a:off x="3387300" y="9073357"/>
+            <a:ext cx="10368915" cy="1071161"/>
           </a:xfrm>
         </p:spPr>
         <p:txBody>
           <a:bodyPr anchor="b"/>
           <a:lstStyle>
             <a:lvl1pPr algn="l">
-              <a:defRPr sz="3200" b="1"/>
+              <a:defRPr sz="3800" b="1"/>
             </a:lvl1pPr>
           </a:lstStyle>
           <a:p>
@@ -2376,8 +2392,8 @@
         </p:nvSpPr>
         <p:spPr>
           <a:xfrm>
-            <a:off x="2867661" y="980440"/>
-            <a:ext cx="8778240" cy="6583680"/>
+            <a:off x="3387300" y="1158173"/>
+            <a:ext cx="10368915" cy="7777163"/>
           </a:xfrm>
         </p:spPr>
         <p:txBody>
@@ -2385,39 +2401,39 @@
           <a:lstStyle>
             <a:lvl1pPr marL="0" indent="0">
               <a:buNone/>
-              <a:defRPr sz="5100"/>
+              <a:defRPr sz="6000"/>
             </a:lvl1pPr>
-            <a:lvl2pPr marL="731520" indent="0">
+            <a:lvl2pPr marL="864071" indent="0">
+              <a:buNone/>
+              <a:defRPr sz="5300"/>
+            </a:lvl2pPr>
+            <a:lvl3pPr marL="1728143" indent="0">
               <a:buNone/>
               <a:defRPr sz="4500"/>
-            </a:lvl2pPr>
-            <a:lvl3pPr marL="1463040" indent="0">
+            </a:lvl3pPr>
+            <a:lvl4pPr marL="2592214" indent="0">
               <a:buNone/>
               <a:defRPr sz="3800"/>
-            </a:lvl3pPr>
-            <a:lvl4pPr marL="2194560" indent="0">
-              <a:buNone/>
-              <a:defRPr sz="3200"/>
             </a:lvl4pPr>
-            <a:lvl5pPr marL="2926080" indent="0">
-              <a:buNone/>
-              <a:defRPr sz="3200"/>
+            <a:lvl5pPr marL="3456286" indent="0">
+              <a:buNone/>
+              <a:defRPr sz="3800"/>
             </a:lvl5pPr>
-            <a:lvl6pPr marL="3657600" indent="0">
-              <a:buNone/>
-              <a:defRPr sz="3200"/>
+            <a:lvl6pPr marL="4320357" indent="0">
+              <a:buNone/>
+              <a:defRPr sz="3800"/>
             </a:lvl6pPr>
-            <a:lvl7pPr marL="4389120" indent="0">
-              <a:buNone/>
-              <a:defRPr sz="3200"/>
+            <a:lvl7pPr marL="5184429" indent="0">
+              <a:buNone/>
+              <a:defRPr sz="3800"/>
             </a:lvl7pPr>
-            <a:lvl8pPr marL="5120640" indent="0">
-              <a:buNone/>
-              <a:defRPr sz="3200"/>
+            <a:lvl8pPr marL="6048500" indent="0">
+              <a:buNone/>
+              <a:defRPr sz="3800"/>
             </a:lvl8pPr>
-            <a:lvl9pPr marL="5852160" indent="0">
-              <a:buNone/>
-              <a:defRPr sz="3200"/>
+            <a:lvl9pPr marL="6912571" indent="0">
+              <a:buNone/>
+              <a:defRPr sz="3800"/>
             </a:lvl9pPr>
           </a:lstStyle>
           <a:p>
@@ -2437,8 +2453,8 @@
         </p:nvSpPr>
         <p:spPr>
           <a:xfrm>
-            <a:off x="2867661" y="8587741"/>
-            <a:ext cx="8778240" cy="1287779"/>
+            <a:off x="3387300" y="10144519"/>
+            <a:ext cx="10368915" cy="1521226"/>
           </a:xfrm>
         </p:spPr>
         <p:txBody>
@@ -2446,39 +2462,39 @@
           <a:lstStyle>
             <a:lvl1pPr marL="0" indent="0">
               <a:buNone/>
+              <a:defRPr sz="2600"/>
+            </a:lvl1pPr>
+            <a:lvl2pPr marL="864071" indent="0">
+              <a:buNone/>
               <a:defRPr sz="2200"/>
-            </a:lvl1pPr>
-            <a:lvl2pPr marL="731520" indent="0">
+            </a:lvl2pPr>
+            <a:lvl3pPr marL="1728143" indent="0">
               <a:buNone/>
               <a:defRPr sz="1900"/>
-            </a:lvl2pPr>
-            <a:lvl3pPr marL="1463040" indent="0">
-              <a:buNone/>
-              <a:defRPr sz="1600"/>
             </a:lvl3pPr>
-            <a:lvl4pPr marL="2194560" indent="0">
-              <a:buNone/>
-              <a:defRPr sz="1400"/>
+            <a:lvl4pPr marL="2592214" indent="0">
+              <a:buNone/>
+              <a:defRPr sz="1700"/>
             </a:lvl4pPr>
-            <a:lvl5pPr marL="2926080" indent="0">
-              <a:buNone/>
-              <a:defRPr sz="1400"/>
+            <a:lvl5pPr marL="3456286" indent="0">
+              <a:buNone/>
+              <a:defRPr sz="1700"/>
             </a:lvl5pPr>
-            <a:lvl6pPr marL="3657600" indent="0">
-              <a:buNone/>
-              <a:defRPr sz="1400"/>
+            <a:lvl6pPr marL="4320357" indent="0">
+              <a:buNone/>
+              <a:defRPr sz="1700"/>
             </a:lvl6pPr>
-            <a:lvl7pPr marL="4389120" indent="0">
-              <a:buNone/>
-              <a:defRPr sz="1400"/>
+            <a:lvl7pPr marL="5184429" indent="0">
+              <a:buNone/>
+              <a:defRPr sz="1700"/>
             </a:lvl7pPr>
-            <a:lvl8pPr marL="5120640" indent="0">
-              <a:buNone/>
-              <a:defRPr sz="1400"/>
+            <a:lvl8pPr marL="6048500" indent="0">
+              <a:buNone/>
+              <a:defRPr sz="1700"/>
             </a:lvl8pPr>
-            <a:lvl9pPr marL="5852160" indent="0">
-              <a:buNone/>
-              <a:defRPr sz="1400"/>
+            <a:lvl9pPr marL="6912571" indent="0">
+              <a:buNone/>
+              <a:defRPr sz="1700"/>
             </a:lvl9pPr>
           </a:lstStyle>
           <a:p>
@@ -2507,7 +2523,7 @@
           <a:p>
             <a:fld id="{038C4A76-0DD3-43B8-8465-4DCB4834B4DF}" type="datetimeFigureOut">
               <a:rPr lang="en-US" smtClean="0"/>
-              <a:t>9/26/2013</a:t>
+              <a:t>16-01-04</a:t>
             </a:fld>
             <a:endParaRPr lang="en-US"/>
           </a:p>
@@ -2605,15 +2621,15 @@
         </p:nvSpPr>
         <p:spPr>
           <a:xfrm>
-            <a:off x="731520" y="439421"/>
-            <a:ext cx="13167360" cy="1828800"/>
+            <a:off x="864076" y="519079"/>
+            <a:ext cx="15553373" cy="2160323"/>
           </a:xfrm>
           <a:prstGeom prst="rect">
             <a:avLst/>
           </a:prstGeom>
         </p:spPr>
         <p:txBody>
-          <a:bodyPr vert="horz" lIns="146304" tIns="73152" rIns="146304" bIns="73152" rtlCol="0" anchor="ctr">
+          <a:bodyPr vert="horz" lIns="172814" tIns="86407" rIns="172814" bIns="86407" rtlCol="0" anchor="ctr">
             <a:normAutofit/>
           </a:bodyPr>
           <a:lstStyle/>
@@ -2638,15 +2654,15 @@
         </p:nvSpPr>
         <p:spPr>
           <a:xfrm>
-            <a:off x="731520" y="2560322"/>
-            <a:ext cx="13167360" cy="7241541"/>
+            <a:off x="864076" y="3024455"/>
+            <a:ext cx="15553373" cy="8554280"/>
           </a:xfrm>
           <a:prstGeom prst="rect">
             <a:avLst/>
           </a:prstGeom>
         </p:spPr>
         <p:txBody>
-          <a:bodyPr vert="horz" lIns="146304" tIns="73152" rIns="146304" bIns="73152" rtlCol="0">
+          <a:bodyPr vert="horz" lIns="172814" tIns="86407" rIns="172814" bIns="86407" rtlCol="0">
             <a:normAutofit/>
           </a:bodyPr>
           <a:lstStyle/>
@@ -2700,18 +2716,18 @@
         </p:nvSpPr>
         <p:spPr>
           <a:xfrm>
-            <a:off x="731520" y="10170162"/>
-            <a:ext cx="3413760" cy="584200"/>
+            <a:off x="864076" y="12013799"/>
+            <a:ext cx="4032356" cy="690103"/>
           </a:xfrm>
           <a:prstGeom prst="rect">
             <a:avLst/>
           </a:prstGeom>
         </p:spPr>
         <p:txBody>
-          <a:bodyPr vert="horz" lIns="146304" tIns="73152" rIns="146304" bIns="73152" rtlCol="0" anchor="ctr"/>
+          <a:bodyPr vert="horz" lIns="172814" tIns="86407" rIns="172814" bIns="86407" rtlCol="0" anchor="ctr"/>
           <a:lstStyle>
             <a:lvl1pPr algn="l">
-              <a:defRPr sz="1900">
+              <a:defRPr sz="2200">
                 <a:solidFill>
                   <a:schemeClr val="tx1">
                     <a:tint val="75000"/>
@@ -2723,7 +2739,7 @@
           <a:p>
             <a:fld id="{038C4A76-0DD3-43B8-8465-4DCB4834B4DF}" type="datetimeFigureOut">
               <a:rPr lang="en-US" smtClean="0"/>
-              <a:t>9/26/2013</a:t>
+              <a:t>16-01-04</a:t>
             </a:fld>
             <a:endParaRPr lang="en-US"/>
           </a:p>
@@ -2741,18 +2757,18 @@
         </p:nvSpPr>
         <p:spPr>
           <a:xfrm>
-            <a:off x="4998720" y="10170162"/>
-            <a:ext cx="4632960" cy="584200"/>
+            <a:off x="5904521" y="12013799"/>
+            <a:ext cx="5472483" cy="690103"/>
           </a:xfrm>
           <a:prstGeom prst="rect">
             <a:avLst/>
           </a:prstGeom>
         </p:spPr>
         <p:txBody>
-          <a:bodyPr vert="horz" lIns="146304" tIns="73152" rIns="146304" bIns="73152" rtlCol="0" anchor="ctr"/>
+          <a:bodyPr vert="horz" lIns="172814" tIns="86407" rIns="172814" bIns="86407" rtlCol="0" anchor="ctr"/>
           <a:lstStyle>
             <a:lvl1pPr algn="ctr">
-              <a:defRPr sz="1900">
+              <a:defRPr sz="2200">
                 <a:solidFill>
                   <a:schemeClr val="tx1">
                     <a:tint val="75000"/>
@@ -2778,18 +2794,18 @@
         </p:nvSpPr>
         <p:spPr>
           <a:xfrm>
-            <a:off x="10485120" y="10170162"/>
-            <a:ext cx="3413760" cy="584200"/>
+            <a:off x="12385093" y="12013799"/>
+            <a:ext cx="4032356" cy="690103"/>
           </a:xfrm>
           <a:prstGeom prst="rect">
             <a:avLst/>
           </a:prstGeom>
         </p:spPr>
         <p:txBody>
-          <a:bodyPr vert="horz" lIns="146304" tIns="73152" rIns="146304" bIns="73152" rtlCol="0" anchor="ctr"/>
+          <a:bodyPr vert="horz" lIns="172814" tIns="86407" rIns="172814" bIns="86407" rtlCol="0" anchor="ctr"/>
           <a:lstStyle>
             <a:lvl1pPr algn="r">
-              <a:defRPr sz="1900">
+              <a:defRPr sz="2200">
                 <a:solidFill>
                   <a:schemeClr val="tx1">
                     <a:tint val="75000"/>
@@ -2830,12 +2846,12 @@
   </p:sldLayoutIdLst>
   <p:txStyles>
     <p:titleStyle>
-      <a:lvl1pPr algn="ctr" defTabSz="1463040" rtl="0" eaLnBrk="1" latinLnBrk="0" hangingPunct="1">
+      <a:lvl1pPr algn="ctr" defTabSz="1728143" rtl="0" eaLnBrk="1" latinLnBrk="0" hangingPunct="1">
         <a:spcBef>
           <a:spcPct val="0"/>
         </a:spcBef>
         <a:buNone/>
-        <a:defRPr sz="7000" kern="1200">
+        <a:defRPr sz="8300" kern="1200">
           <a:solidFill>
             <a:schemeClr val="tx1"/>
           </a:solidFill>
@@ -2846,13 +2862,13 @@
       </a:lvl1pPr>
     </p:titleStyle>
     <p:bodyStyle>
-      <a:lvl1pPr marL="548640" indent="-548640" algn="l" defTabSz="1463040" rtl="0" eaLnBrk="1" latinLnBrk="0" hangingPunct="1">
+      <a:lvl1pPr marL="648054" indent="-648054" algn="l" defTabSz="1728143" rtl="0" eaLnBrk="1" latinLnBrk="0" hangingPunct="1">
         <a:spcBef>
           <a:spcPct val="20000"/>
         </a:spcBef>
         <a:buFont typeface="Arial" pitchFamily="34" charset="0"/>
         <a:buChar char="•"/>
-        <a:defRPr sz="5100" kern="1200">
+        <a:defRPr sz="6000" kern="1200">
           <a:solidFill>
             <a:schemeClr val="tx1"/>
           </a:solidFill>
@@ -2861,13 +2877,13 @@
           <a:cs typeface="+mn-cs"/>
         </a:defRPr>
       </a:lvl1pPr>
-      <a:lvl2pPr marL="1188720" indent="-457200" algn="l" defTabSz="1463040" rtl="0" eaLnBrk="1" latinLnBrk="0" hangingPunct="1">
+      <a:lvl2pPr marL="1404116" indent="-540045" algn="l" defTabSz="1728143" rtl="0" eaLnBrk="1" latinLnBrk="0" hangingPunct="1">
         <a:spcBef>
           <a:spcPct val="20000"/>
         </a:spcBef>
         <a:buFont typeface="Arial" pitchFamily="34" charset="0"/>
         <a:buChar char="–"/>
-        <a:defRPr sz="4500" kern="1200">
+        <a:defRPr sz="5300" kern="1200">
           <a:solidFill>
             <a:schemeClr val="tx1"/>
           </a:solidFill>
@@ -2876,7 +2892,52 @@
           <a:cs typeface="+mn-cs"/>
         </a:defRPr>
       </a:lvl2pPr>
-      <a:lvl3pPr marL="1828800" indent="-365760" algn="l" defTabSz="1463040" rtl="0" eaLnBrk="1" latinLnBrk="0" hangingPunct="1">
+      <a:lvl3pPr marL="2160179" indent="-432036" algn="l" defTabSz="1728143" rtl="0" eaLnBrk="1" latinLnBrk="0" hangingPunct="1">
+        <a:spcBef>
+          <a:spcPct val="20000"/>
+        </a:spcBef>
+        <a:buFont typeface="Arial" pitchFamily="34" charset="0"/>
+        <a:buChar char="•"/>
+        <a:defRPr sz="4500" kern="1200">
+          <a:solidFill>
+            <a:schemeClr val="tx1"/>
+          </a:solidFill>
+          <a:latin typeface="+mn-lt"/>
+          <a:ea typeface="+mn-ea"/>
+          <a:cs typeface="+mn-cs"/>
+        </a:defRPr>
+      </a:lvl3pPr>
+      <a:lvl4pPr marL="3024250" indent="-432036" algn="l" defTabSz="1728143" rtl="0" eaLnBrk="1" latinLnBrk="0" hangingPunct="1">
+        <a:spcBef>
+          <a:spcPct val="20000"/>
+        </a:spcBef>
+        <a:buFont typeface="Arial" pitchFamily="34" charset="0"/>
+        <a:buChar char="–"/>
+        <a:defRPr sz="3800" kern="1200">
+          <a:solidFill>
+            <a:schemeClr val="tx1"/>
+          </a:solidFill>
+          <a:latin typeface="+mn-lt"/>
+          <a:ea typeface="+mn-ea"/>
+          <a:cs typeface="+mn-cs"/>
+        </a:defRPr>
+      </a:lvl4pPr>
+      <a:lvl5pPr marL="3888321" indent="-432036" algn="l" defTabSz="1728143" rtl="0" eaLnBrk="1" latinLnBrk="0" hangingPunct="1">
+        <a:spcBef>
+          <a:spcPct val="20000"/>
+        </a:spcBef>
+        <a:buFont typeface="Arial" pitchFamily="34" charset="0"/>
+        <a:buChar char="»"/>
+        <a:defRPr sz="3800" kern="1200">
+          <a:solidFill>
+            <a:schemeClr val="tx1"/>
+          </a:solidFill>
+          <a:latin typeface="+mn-lt"/>
+          <a:ea typeface="+mn-ea"/>
+          <a:cs typeface="+mn-cs"/>
+        </a:defRPr>
+      </a:lvl5pPr>
+      <a:lvl6pPr marL="4752393" indent="-432036" algn="l" defTabSz="1728143" rtl="0" eaLnBrk="1" latinLnBrk="0" hangingPunct="1">
         <a:spcBef>
           <a:spcPct val="20000"/>
         </a:spcBef>
@@ -2890,44 +2951,14 @@
           <a:ea typeface="+mn-ea"/>
           <a:cs typeface="+mn-cs"/>
         </a:defRPr>
-      </a:lvl3pPr>
-      <a:lvl4pPr marL="2560320" indent="-365760" algn="l" defTabSz="1463040" rtl="0" eaLnBrk="1" latinLnBrk="0" hangingPunct="1">
-        <a:spcBef>
-          <a:spcPct val="20000"/>
-        </a:spcBef>
-        <a:buFont typeface="Arial" pitchFamily="34" charset="0"/>
-        <a:buChar char="–"/>
-        <a:defRPr sz="3200" kern="1200">
-          <a:solidFill>
-            <a:schemeClr val="tx1"/>
-          </a:solidFill>
-          <a:latin typeface="+mn-lt"/>
-          <a:ea typeface="+mn-ea"/>
-          <a:cs typeface="+mn-cs"/>
-        </a:defRPr>
-      </a:lvl4pPr>
-      <a:lvl5pPr marL="3291840" indent="-365760" algn="l" defTabSz="1463040" rtl="0" eaLnBrk="1" latinLnBrk="0" hangingPunct="1">
-        <a:spcBef>
-          <a:spcPct val="20000"/>
-        </a:spcBef>
-        <a:buFont typeface="Arial" pitchFamily="34" charset="0"/>
-        <a:buChar char="»"/>
-        <a:defRPr sz="3200" kern="1200">
-          <a:solidFill>
-            <a:schemeClr val="tx1"/>
-          </a:solidFill>
-          <a:latin typeface="+mn-lt"/>
-          <a:ea typeface="+mn-ea"/>
-          <a:cs typeface="+mn-cs"/>
-        </a:defRPr>
-      </a:lvl5pPr>
-      <a:lvl6pPr marL="4023360" indent="-365760" algn="l" defTabSz="1463040" rtl="0" eaLnBrk="1" latinLnBrk="0" hangingPunct="1">
+      </a:lvl6pPr>
+      <a:lvl7pPr marL="5616464" indent="-432036" algn="l" defTabSz="1728143" rtl="0" eaLnBrk="1" latinLnBrk="0" hangingPunct="1">
         <a:spcBef>
           <a:spcPct val="20000"/>
         </a:spcBef>
         <a:buFont typeface="Arial" pitchFamily="34" charset="0"/>
         <a:buChar char="•"/>
-        <a:defRPr sz="3200" kern="1200">
+        <a:defRPr sz="3800" kern="1200">
           <a:solidFill>
             <a:schemeClr val="tx1"/>
           </a:solidFill>
@@ -2935,14 +2966,14 @@
           <a:ea typeface="+mn-ea"/>
           <a:cs typeface="+mn-cs"/>
         </a:defRPr>
-      </a:lvl6pPr>
-      <a:lvl7pPr marL="4754880" indent="-365760" algn="l" defTabSz="1463040" rtl="0" eaLnBrk="1" latinLnBrk="0" hangingPunct="1">
+      </a:lvl7pPr>
+      <a:lvl8pPr marL="6480536" indent="-432036" algn="l" defTabSz="1728143" rtl="0" eaLnBrk="1" latinLnBrk="0" hangingPunct="1">
         <a:spcBef>
           <a:spcPct val="20000"/>
         </a:spcBef>
         <a:buFont typeface="Arial" pitchFamily="34" charset="0"/>
         <a:buChar char="•"/>
-        <a:defRPr sz="3200" kern="1200">
+        <a:defRPr sz="3800" kern="1200">
           <a:solidFill>
             <a:schemeClr val="tx1"/>
           </a:solidFill>
@@ -2950,29 +2981,14 @@
           <a:ea typeface="+mn-ea"/>
           <a:cs typeface="+mn-cs"/>
         </a:defRPr>
-      </a:lvl7pPr>
-      <a:lvl8pPr marL="5486400" indent="-365760" algn="l" defTabSz="1463040" rtl="0" eaLnBrk="1" latinLnBrk="0" hangingPunct="1">
+      </a:lvl8pPr>
+      <a:lvl9pPr marL="7344607" indent="-432036" algn="l" defTabSz="1728143" rtl="0" eaLnBrk="1" latinLnBrk="0" hangingPunct="1">
         <a:spcBef>
           <a:spcPct val="20000"/>
         </a:spcBef>
         <a:buFont typeface="Arial" pitchFamily="34" charset="0"/>
         <a:buChar char="•"/>
-        <a:defRPr sz="3200" kern="1200">
-          <a:solidFill>
-            <a:schemeClr val="tx1"/>
-          </a:solidFill>
-          <a:latin typeface="+mn-lt"/>
-          <a:ea typeface="+mn-ea"/>
-          <a:cs typeface="+mn-cs"/>
-        </a:defRPr>
-      </a:lvl8pPr>
-      <a:lvl9pPr marL="6217920" indent="-365760" algn="l" defTabSz="1463040" rtl="0" eaLnBrk="1" latinLnBrk="0" hangingPunct="1">
-        <a:spcBef>
-          <a:spcPct val="20000"/>
-        </a:spcBef>
-        <a:buFont typeface="Arial" pitchFamily="34" charset="0"/>
-        <a:buChar char="•"/>
-        <a:defRPr sz="3200" kern="1200">
+        <a:defRPr sz="3800" kern="1200">
           <a:solidFill>
             <a:schemeClr val="tx1"/>
           </a:solidFill>
@@ -2986,8 +3002,8 @@
       <a:defPPr>
         <a:defRPr lang="en-US"/>
       </a:defPPr>
-      <a:lvl1pPr marL="0" algn="l" defTabSz="1463040" rtl="0" eaLnBrk="1" latinLnBrk="0" hangingPunct="1">
-        <a:defRPr sz="2900" kern="1200">
+      <a:lvl1pPr marL="0" algn="l" defTabSz="1728143" rtl="0" eaLnBrk="1" latinLnBrk="0" hangingPunct="1">
+        <a:defRPr sz="3400" kern="1200">
           <a:solidFill>
             <a:schemeClr val="tx1"/>
           </a:solidFill>
@@ -2996,8 +3012,8 @@
           <a:cs typeface="+mn-cs"/>
         </a:defRPr>
       </a:lvl1pPr>
-      <a:lvl2pPr marL="731520" algn="l" defTabSz="1463040" rtl="0" eaLnBrk="1" latinLnBrk="0" hangingPunct="1">
-        <a:defRPr sz="2900" kern="1200">
+      <a:lvl2pPr marL="864071" algn="l" defTabSz="1728143" rtl="0" eaLnBrk="1" latinLnBrk="0" hangingPunct="1">
+        <a:defRPr sz="3400" kern="1200">
           <a:solidFill>
             <a:schemeClr val="tx1"/>
           </a:solidFill>
@@ -3006,8 +3022,8 @@
           <a:cs typeface="+mn-cs"/>
         </a:defRPr>
       </a:lvl2pPr>
-      <a:lvl3pPr marL="1463040" algn="l" defTabSz="1463040" rtl="0" eaLnBrk="1" latinLnBrk="0" hangingPunct="1">
-        <a:defRPr sz="2900" kern="1200">
+      <a:lvl3pPr marL="1728143" algn="l" defTabSz="1728143" rtl="0" eaLnBrk="1" latinLnBrk="0" hangingPunct="1">
+        <a:defRPr sz="3400" kern="1200">
           <a:solidFill>
             <a:schemeClr val="tx1"/>
           </a:solidFill>
@@ -3016,8 +3032,8 @@
           <a:cs typeface="+mn-cs"/>
         </a:defRPr>
       </a:lvl3pPr>
-      <a:lvl4pPr marL="2194560" algn="l" defTabSz="1463040" rtl="0" eaLnBrk="1" latinLnBrk="0" hangingPunct="1">
-        <a:defRPr sz="2900" kern="1200">
+      <a:lvl4pPr marL="2592214" algn="l" defTabSz="1728143" rtl="0" eaLnBrk="1" latinLnBrk="0" hangingPunct="1">
+        <a:defRPr sz="3400" kern="1200">
           <a:solidFill>
             <a:schemeClr val="tx1"/>
           </a:solidFill>
@@ -3026,8 +3042,8 @@
           <a:cs typeface="+mn-cs"/>
         </a:defRPr>
       </a:lvl4pPr>
-      <a:lvl5pPr marL="2926080" algn="l" defTabSz="1463040" rtl="0" eaLnBrk="1" latinLnBrk="0" hangingPunct="1">
-        <a:defRPr sz="2900" kern="1200">
+      <a:lvl5pPr marL="3456286" algn="l" defTabSz="1728143" rtl="0" eaLnBrk="1" latinLnBrk="0" hangingPunct="1">
+        <a:defRPr sz="3400" kern="1200">
           <a:solidFill>
             <a:schemeClr val="tx1"/>
           </a:solidFill>
@@ -3036,8 +3052,8 @@
           <a:cs typeface="+mn-cs"/>
         </a:defRPr>
       </a:lvl5pPr>
-      <a:lvl6pPr marL="3657600" algn="l" defTabSz="1463040" rtl="0" eaLnBrk="1" latinLnBrk="0" hangingPunct="1">
-        <a:defRPr sz="2900" kern="1200">
+      <a:lvl6pPr marL="4320357" algn="l" defTabSz="1728143" rtl="0" eaLnBrk="1" latinLnBrk="0" hangingPunct="1">
+        <a:defRPr sz="3400" kern="1200">
           <a:solidFill>
             <a:schemeClr val="tx1"/>
           </a:solidFill>
@@ -3046,8 +3062,8 @@
           <a:cs typeface="+mn-cs"/>
         </a:defRPr>
       </a:lvl6pPr>
-      <a:lvl7pPr marL="4389120" algn="l" defTabSz="1463040" rtl="0" eaLnBrk="1" latinLnBrk="0" hangingPunct="1">
-        <a:defRPr sz="2900" kern="1200">
+      <a:lvl7pPr marL="5184429" algn="l" defTabSz="1728143" rtl="0" eaLnBrk="1" latinLnBrk="0" hangingPunct="1">
+        <a:defRPr sz="3400" kern="1200">
           <a:solidFill>
             <a:schemeClr val="tx1"/>
           </a:solidFill>
@@ -3056,8 +3072,8 @@
           <a:cs typeface="+mn-cs"/>
         </a:defRPr>
       </a:lvl7pPr>
-      <a:lvl8pPr marL="5120640" algn="l" defTabSz="1463040" rtl="0" eaLnBrk="1" latinLnBrk="0" hangingPunct="1">
-        <a:defRPr sz="2900" kern="1200">
+      <a:lvl8pPr marL="6048500" algn="l" defTabSz="1728143" rtl="0" eaLnBrk="1" latinLnBrk="0" hangingPunct="1">
+        <a:defRPr sz="3400" kern="1200">
           <a:solidFill>
             <a:schemeClr val="tx1"/>
           </a:solidFill>
@@ -3066,8 +3082,8 @@
           <a:cs typeface="+mn-cs"/>
         </a:defRPr>
       </a:lvl8pPr>
-      <a:lvl9pPr marL="5852160" algn="l" defTabSz="1463040" rtl="0" eaLnBrk="1" latinLnBrk="0" hangingPunct="1">
-        <a:defRPr sz="2900" kern="1200">
+      <a:lvl9pPr marL="6912571" algn="l" defTabSz="1728143" rtl="0" eaLnBrk="1" latinLnBrk="0" hangingPunct="1">
+        <a:defRPr sz="3400" kern="1200">
           <a:solidFill>
             <a:schemeClr val="tx1"/>
           </a:solidFill>
@@ -3100,15 +3116,15 @@
       </p:grpSpPr>
       <p:cxnSp>
         <p:nvCxnSpPr>
-          <p:cNvPr id="41" name="Straight Arrow Connector 40"/>
+          <p:cNvPr id="37" name="Straight Arrow Connector 36"/>
           <p:cNvCxnSpPr>
-            <a:endCxn id="52" idx="3"/>
+            <a:endCxn id="64" idx="3"/>
           </p:cNvCxnSpPr>
           <p:nvPr/>
         </p:nvCxnSpPr>
         <p:spPr bwMode="auto">
           <a:xfrm flipH="1">
-            <a:off x="3239552" y="1831268"/>
+            <a:off x="3193514" y="1304913"/>
             <a:ext cx="951448" cy="0"/>
           </a:xfrm>
           <a:prstGeom prst="straightConnector1">
@@ -3131,14 +3147,14 @@
       </p:cxnSp>
       <p:sp>
         <p:nvSpPr>
-          <p:cNvPr id="42" name="Rectangle 41"/>
+          <p:cNvPr id="38" name="Rectangle 37"/>
           <p:cNvSpPr/>
           <p:nvPr/>
         </p:nvSpPr>
         <p:spPr bwMode="auto">
           <a:xfrm>
-            <a:off x="4191000" y="1216124"/>
-            <a:ext cx="10257854" cy="8928992"/>
+            <a:off x="4144962" y="689769"/>
+            <a:ext cx="10257854" cy="11125200"/>
           </a:xfrm>
           <a:prstGeom prst="rect">
             <a:avLst/>
@@ -3176,14 +3192,14 @@
       </p:sp>
       <p:sp>
         <p:nvSpPr>
-          <p:cNvPr id="43" name="Rectangle 42"/>
+          <p:cNvPr id="39" name="Rectangle 38"/>
           <p:cNvSpPr/>
           <p:nvPr/>
         </p:nvSpPr>
         <p:spPr bwMode="auto">
           <a:xfrm>
-            <a:off x="5410200" y="1576164"/>
-            <a:ext cx="8716382" cy="8136904"/>
+            <a:off x="5364162" y="1049809"/>
+            <a:ext cx="8716382" cy="10460360"/>
           </a:xfrm>
           <a:prstGeom prst="rect">
             <a:avLst/>
@@ -3240,13 +3256,13 @@
       </p:sp>
       <p:sp>
         <p:nvSpPr>
-          <p:cNvPr id="44" name="Rectangle 43"/>
+          <p:cNvPr id="40" name="Rectangle 39"/>
           <p:cNvSpPr/>
           <p:nvPr/>
         </p:nvSpPr>
         <p:spPr bwMode="auto">
           <a:xfrm>
-            <a:off x="9764001" y="7924800"/>
+            <a:off x="9717963" y="8614569"/>
             <a:ext cx="4104399" cy="1189601"/>
           </a:xfrm>
           <a:prstGeom prst="rect">
@@ -3288,20 +3304,32 @@
               <a:rPr lang="en-US" sz="3200" dirty="0">
                 <a:latin typeface="Arial" charset="0"/>
               </a:rPr>
-              <a:t>DICOM import plugin mechanism</a:t>
-            </a:r>
-          </a:p>
-        </p:txBody>
-      </p:sp>
-      <p:sp>
-        <p:nvSpPr>
-          <p:cNvPr id="45" name="Rectangle 44"/>
+              <a:t>DICOM </a:t>
+            </a:r>
+            <a:r>
+              <a:rPr lang="en-US" sz="3200" dirty="0" smtClean="0">
+                <a:latin typeface="Arial" charset="0"/>
+              </a:rPr>
+              <a:t>import/export plugin </a:t>
+            </a:r>
+            <a:r>
+              <a:rPr lang="en-US" sz="3200" dirty="0">
+                <a:latin typeface="Arial" charset="0"/>
+              </a:rPr>
+              <a:t>mechanism</a:t>
+            </a:r>
+          </a:p>
+        </p:txBody>
+      </p:sp>
+      <p:sp>
+        <p:nvSpPr>
+          <p:cNvPr id="53" name="Rectangle 52"/>
           <p:cNvSpPr/>
           <p:nvPr/>
         </p:nvSpPr>
         <p:spPr bwMode="auto">
           <a:xfrm>
-            <a:off x="4419600" y="7334250"/>
+            <a:off x="4373562" y="8024019"/>
             <a:ext cx="3564396" cy="1188132"/>
           </a:xfrm>
           <a:prstGeom prst="rect">
@@ -3349,26 +3377,23 @@
               <a:rPr lang="en-US" sz="3200" dirty="0" smtClean="0">
                 <a:latin typeface="Arial" charset="0"/>
               </a:rPr>
-              <a:t>Import </a:t>
-            </a:r>
-            <a:r>
-              <a:rPr lang="en-US" sz="3200" dirty="0">
-                <a:latin typeface="Arial" charset="0"/>
-              </a:rPr>
               <a:t>plugin</a:t>
             </a:r>
-          </a:p>
-        </p:txBody>
-      </p:sp>
-      <p:sp>
-        <p:nvSpPr>
-          <p:cNvPr id="46" name="Rectangle 45"/>
+            <a:endParaRPr lang="en-US" sz="3200" dirty="0">
+              <a:latin typeface="Arial" charset="0"/>
+            </a:endParaRPr>
+          </a:p>
+        </p:txBody>
+      </p:sp>
+      <p:sp>
+        <p:nvSpPr>
+          <p:cNvPr id="54" name="Rectangle 53"/>
           <p:cNvSpPr/>
           <p:nvPr/>
         </p:nvSpPr>
         <p:spPr bwMode="auto">
           <a:xfrm>
-            <a:off x="4419600" y="8709011"/>
+            <a:off x="4373562" y="9398780"/>
             <a:ext cx="3566160" cy="790076"/>
           </a:xfrm>
           <a:prstGeom prst="rect">
@@ -3417,15 +3442,15 @@
       </p:sp>
       <p:cxnSp>
         <p:nvCxnSpPr>
-          <p:cNvPr id="47" name="Straight Arrow Connector 46"/>
+          <p:cNvPr id="57" name="Straight Arrow Connector 56"/>
           <p:cNvCxnSpPr>
-            <a:stCxn id="45" idx="3"/>
+            <a:stCxn id="53" idx="3"/>
           </p:cNvCxnSpPr>
           <p:nvPr/>
         </p:nvCxnSpPr>
         <p:spPr bwMode="auto">
           <a:xfrm>
-            <a:off x="7983996" y="7928316"/>
+            <a:off x="7937958" y="8618085"/>
             <a:ext cx="1780005" cy="396534"/>
           </a:xfrm>
           <a:prstGeom prst="straightConnector1">
@@ -3448,15 +3473,15 @@
       </p:cxnSp>
       <p:cxnSp>
         <p:nvCxnSpPr>
-          <p:cNvPr id="49" name="Straight Arrow Connector 48"/>
+          <p:cNvPr id="58" name="Straight Arrow Connector 57"/>
           <p:cNvCxnSpPr>
-            <a:stCxn id="46" idx="3"/>
+            <a:stCxn id="54" idx="3"/>
           </p:cNvCxnSpPr>
           <p:nvPr/>
         </p:nvCxnSpPr>
         <p:spPr bwMode="auto">
           <a:xfrm flipV="1">
-            <a:off x="7985760" y="8709011"/>
+            <a:off x="7939722" y="9398780"/>
             <a:ext cx="1782631" cy="395038"/>
           </a:xfrm>
           <a:prstGeom prst="straightConnector1">
@@ -3479,13 +3504,13 @@
       </p:cxnSp>
       <p:sp>
         <p:nvSpPr>
-          <p:cNvPr id="52" name="Rectangle 51"/>
+          <p:cNvPr id="64" name="Rectangle 63"/>
           <p:cNvSpPr/>
           <p:nvPr/>
         </p:nvSpPr>
         <p:spPr bwMode="auto">
           <a:xfrm>
-            <a:off x="575256" y="1219200"/>
+            <a:off x="529218" y="692845"/>
             <a:ext cx="2664296" cy="1224136"/>
           </a:xfrm>
           <a:prstGeom prst="rect">
@@ -3531,13 +3556,13 @@
       </p:sp>
       <p:sp>
         <p:nvSpPr>
-          <p:cNvPr id="55" name="Rectangle 54"/>
+          <p:cNvPr id="67" name="Rectangle 66"/>
           <p:cNvSpPr/>
           <p:nvPr/>
         </p:nvSpPr>
         <p:spPr bwMode="auto">
           <a:xfrm>
-            <a:off x="4419600" y="2673699"/>
+            <a:off x="4373562" y="3363468"/>
             <a:ext cx="9453190" cy="4477728"/>
           </a:xfrm>
           <a:prstGeom prst="rect">
@@ -3573,16 +3598,16 @@
           <a:p>
             <a:pPr algn="ctr" defTabSz="4389438"/>
             <a:r>
-              <a:rPr lang="en-US" sz="3200" dirty="0" smtClean="0">
+              <a:rPr lang="en-US" sz="3200" smtClean="0">
                 <a:latin typeface="Arial" charset="0"/>
               </a:rPr>
-              <a:t>                                                       </a:t>
-            </a:r>
-            <a:r>
-              <a:rPr lang="en-US" sz="4000" dirty="0" smtClean="0">
+              <a:t>                                                     </a:t>
+            </a:r>
+            <a:r>
+              <a:rPr lang="en-US" sz="4000" smtClean="0">
                 <a:latin typeface="Arial" charset="0"/>
               </a:rPr>
-              <a:t>SlicerRT</a:t>
+              <a:t>SlicerRT core</a:t>
             </a:r>
             <a:endParaRPr lang="en-US" sz="3600" dirty="0">
               <a:latin typeface="Arial" charset="0"/>
@@ -3592,16 +3617,16 @@
       </p:sp>
       <p:cxnSp>
         <p:nvCxnSpPr>
-          <p:cNvPr id="59" name="Straight Arrow Connector 58"/>
+          <p:cNvPr id="68" name="Straight Arrow Connector 67"/>
           <p:cNvCxnSpPr>
-            <a:endCxn id="62" idx="3"/>
+            <a:endCxn id="70" idx="3"/>
           </p:cNvCxnSpPr>
           <p:nvPr/>
         </p:nvCxnSpPr>
         <p:spPr bwMode="auto">
-          <a:xfrm flipH="1" flipV="1">
-            <a:off x="3239552" y="7927268"/>
-            <a:ext cx="951448" cy="1048"/>
+          <a:xfrm flipH="1">
+            <a:off x="3193514" y="9270733"/>
+            <a:ext cx="951448" cy="0"/>
           </a:xfrm>
           <a:prstGeom prst="straightConnector1">
             <a:avLst/>
@@ -3623,16 +3648,16 @@
       </p:cxnSp>
       <p:cxnSp>
         <p:nvCxnSpPr>
-          <p:cNvPr id="60" name="Straight Arrow Connector 59"/>
+          <p:cNvPr id="69" name="Straight Arrow Connector 68"/>
           <p:cNvCxnSpPr>
-            <a:endCxn id="63" idx="3"/>
+            <a:endCxn id="71" idx="3"/>
           </p:cNvCxnSpPr>
           <p:nvPr/>
         </p:nvCxnSpPr>
         <p:spPr bwMode="auto">
-          <a:xfrm flipH="1" flipV="1">
-            <a:off x="3239552" y="9598732"/>
-            <a:ext cx="951448" cy="4900"/>
+          <a:xfrm flipH="1">
+            <a:off x="3193514" y="11126701"/>
+            <a:ext cx="951448" cy="0"/>
           </a:xfrm>
           <a:prstGeom prst="straightConnector1">
             <a:avLst/>
@@ -3654,13 +3679,13 @@
       </p:cxnSp>
       <p:sp>
         <p:nvSpPr>
-          <p:cNvPr id="62" name="Rectangle 61"/>
+          <p:cNvPr id="70" name="Rectangle 69"/>
           <p:cNvSpPr/>
           <p:nvPr/>
         </p:nvSpPr>
         <p:spPr bwMode="auto">
           <a:xfrm>
-            <a:off x="575256" y="7315200"/>
+            <a:off x="529218" y="8658665"/>
             <a:ext cx="2664296" cy="1224136"/>
           </a:xfrm>
           <a:prstGeom prst="rect">
@@ -3706,13 +3731,13 @@
       </p:sp>
       <p:sp>
         <p:nvSpPr>
-          <p:cNvPr id="63" name="Rectangle 62"/>
+          <p:cNvPr id="71" name="Rectangle 70"/>
           <p:cNvSpPr/>
           <p:nvPr/>
         </p:nvSpPr>
         <p:spPr bwMode="auto">
           <a:xfrm>
-            <a:off x="575256" y="8986664"/>
+            <a:off x="529218" y="10514633"/>
             <a:ext cx="2664296" cy="1224136"/>
           </a:xfrm>
           <a:prstGeom prst="rect">
@@ -3758,13 +3783,13 @@
       </p:sp>
       <p:sp>
         <p:nvSpPr>
-          <p:cNvPr id="24" name="Rectangle 23"/>
+          <p:cNvPr id="72" name="Rectangle 71"/>
           <p:cNvSpPr/>
           <p:nvPr/>
         </p:nvSpPr>
         <p:spPr bwMode="auto">
           <a:xfrm>
-            <a:off x="533400" y="3583338"/>
+            <a:off x="487362" y="2975769"/>
             <a:ext cx="2748009" cy="1339125"/>
           </a:xfrm>
           <a:prstGeom prst="rect">
@@ -3813,13 +3838,13 @@
       </p:sp>
       <p:sp>
         <p:nvSpPr>
-          <p:cNvPr id="25" name="Rectangle 24"/>
+          <p:cNvPr id="75" name="Rectangle 74"/>
           <p:cNvSpPr/>
           <p:nvPr/>
         </p:nvSpPr>
         <p:spPr bwMode="auto">
           <a:xfrm>
-            <a:off x="575256" y="5633864"/>
+            <a:off x="529218" y="4946727"/>
             <a:ext cx="2664296" cy="1224136"/>
           </a:xfrm>
           <a:prstGeom prst="rect">
@@ -3868,16 +3893,16 @@
       </p:sp>
       <p:cxnSp>
         <p:nvCxnSpPr>
-          <p:cNvPr id="27" name="Straight Arrow Connector 26"/>
+          <p:cNvPr id="76" name="Straight Arrow Connector 75"/>
           <p:cNvCxnSpPr>
-            <a:endCxn id="25" idx="3"/>
+            <a:endCxn id="75" idx="3"/>
           </p:cNvCxnSpPr>
           <p:nvPr/>
         </p:nvCxnSpPr>
         <p:spPr bwMode="auto">
-          <a:xfrm flipH="1" flipV="1">
-            <a:off x="3239552" y="6245932"/>
-            <a:ext cx="951448" cy="7088"/>
+          <a:xfrm flipH="1">
+            <a:off x="3193514" y="5558795"/>
+            <a:ext cx="951448" cy="0"/>
           </a:xfrm>
           <a:prstGeom prst="straightConnector1">
             <a:avLst/>
@@ -3899,15 +3924,15 @@
       </p:cxnSp>
       <p:cxnSp>
         <p:nvCxnSpPr>
-          <p:cNvPr id="34" name="Straight Arrow Connector 33"/>
+          <p:cNvPr id="77" name="Straight Arrow Connector 76"/>
           <p:cNvCxnSpPr>
-            <a:endCxn id="24" idx="3"/>
+            <a:endCxn id="72" idx="3"/>
           </p:cNvCxnSpPr>
           <p:nvPr/>
         </p:nvCxnSpPr>
         <p:spPr bwMode="auto">
           <a:xfrm flipH="1">
-            <a:off x="3281409" y="4252900"/>
+            <a:off x="3235371" y="3645331"/>
             <a:ext cx="909591" cy="1"/>
           </a:xfrm>
           <a:prstGeom prst="straightConnector1">
@@ -3930,17 +3955,17 @@
       </p:cxnSp>
       <p:cxnSp>
         <p:nvCxnSpPr>
-          <p:cNvPr id="28" name="Straight Arrow Connector 27"/>
+          <p:cNvPr id="81" name="Straight Arrow Connector 80"/>
           <p:cNvCxnSpPr>
-            <a:stCxn id="52" idx="2"/>
-            <a:endCxn id="24" idx="0"/>
+            <a:stCxn id="64" idx="2"/>
+            <a:endCxn id="72" idx="0"/>
           </p:cNvCxnSpPr>
           <p:nvPr/>
         </p:nvCxnSpPr>
         <p:spPr bwMode="auto">
           <a:xfrm>
-            <a:off x="1907404" y="2443336"/>
-            <a:ext cx="1" cy="1140002"/>
+            <a:off x="1861366" y="1916981"/>
+            <a:ext cx="1" cy="1058788"/>
           </a:xfrm>
           <a:prstGeom prst="straightConnector1">
             <a:avLst/>
@@ -3962,13 +3987,13 @@
       </p:cxnSp>
       <p:sp>
         <p:nvSpPr>
-          <p:cNvPr id="21" name="TextBox 20"/>
+          <p:cNvPr id="82" name="TextBox 81"/>
           <p:cNvSpPr txBox="1"/>
           <p:nvPr/>
         </p:nvSpPr>
         <p:spPr>
           <a:xfrm>
-            <a:off x="10654353" y="3411981"/>
+            <a:off x="10608315" y="4101750"/>
             <a:ext cx="2985654" cy="1739102"/>
           </a:xfrm>
           <a:prstGeom prst="rect">
@@ -4044,13 +4069,13 @@
       </p:sp>
       <p:sp>
         <p:nvSpPr>
-          <p:cNvPr id="22" name="TextBox 21"/>
+          <p:cNvPr id="83" name="TextBox 82"/>
           <p:cNvSpPr txBox="1"/>
           <p:nvPr/>
         </p:nvSpPr>
         <p:spPr>
           <a:xfrm>
-            <a:off x="4648200" y="2833276"/>
+            <a:off x="4602162" y="3523045"/>
             <a:ext cx="5558278" cy="4122532"/>
           </a:xfrm>
           <a:prstGeom prst="rect">
@@ -4095,21 +4120,25 @@
           <a:p>
             <a:pPr algn="r"/>
             <a:r>
+              <a:rPr lang="en-US" dirty="0" smtClean="0"/>
+              <a:t>Loadable / scripted </a:t>
+            </a:r>
+            <a:r>
               <a:rPr lang="en-US" dirty="0"/>
-              <a:t>Loadable modules</a:t>
-            </a:r>
-          </a:p>
-        </p:txBody>
-      </p:sp>
-      <p:sp>
-        <p:nvSpPr>
-          <p:cNvPr id="84" name="TextBox 83"/>
+              <a:t>modules</a:t>
+            </a:r>
+          </a:p>
+        </p:txBody>
+      </p:sp>
+      <p:sp>
+        <p:nvSpPr>
+          <p:cNvPr id="85" name="TextBox 84"/>
           <p:cNvSpPr txBox="1"/>
           <p:nvPr/>
         </p:nvSpPr>
         <p:spPr>
           <a:xfrm>
-            <a:off x="10229564" y="5441049"/>
+            <a:off x="10183526" y="6130818"/>
             <a:ext cx="3410443" cy="1514759"/>
           </a:xfrm>
           <a:prstGeom prst="rect">
@@ -4159,15 +4188,15 @@
       </p:sp>
       <p:cxnSp>
         <p:nvCxnSpPr>
-          <p:cNvPr id="51" name="Straight Arrow Connector 50"/>
+          <p:cNvPr id="86" name="Straight Arrow Connector 85"/>
           <p:cNvCxnSpPr>
-            <a:stCxn id="56" idx="3"/>
+            <a:stCxn id="87" idx="3"/>
           </p:cNvCxnSpPr>
           <p:nvPr/>
         </p:nvCxnSpPr>
         <p:spPr bwMode="auto">
           <a:xfrm>
-            <a:off x="9951876" y="3979955"/>
+            <a:off x="9905838" y="4669724"/>
             <a:ext cx="702477" cy="1"/>
           </a:xfrm>
           <a:prstGeom prst="straightConnector1">
@@ -4190,13 +4219,13 @@
       </p:cxnSp>
       <p:sp>
         <p:nvSpPr>
-          <p:cNvPr id="56" name="Rectangle 55"/>
+          <p:cNvPr id="87" name="Rectangle 86"/>
           <p:cNvSpPr/>
           <p:nvPr/>
         </p:nvSpPr>
         <p:spPr bwMode="auto">
           <a:xfrm>
-            <a:off x="7467600" y="3458015"/>
+            <a:off x="7421562" y="4147784"/>
             <a:ext cx="2484276" cy="1043880"/>
           </a:xfrm>
           <a:prstGeom prst="rect">
@@ -4245,13 +4274,13 @@
       </p:sp>
       <p:sp>
         <p:nvSpPr>
-          <p:cNvPr id="61" name="Rectangle 60"/>
+          <p:cNvPr id="89" name="Rectangle 88"/>
           <p:cNvSpPr/>
           <p:nvPr/>
         </p:nvSpPr>
         <p:spPr bwMode="auto">
           <a:xfrm>
-            <a:off x="4890449" y="3454315"/>
+            <a:off x="4844411" y="4144084"/>
             <a:ext cx="2287979" cy="660801"/>
           </a:xfrm>
           <a:prstGeom prst="rect">
@@ -4287,10 +4316,10 @@
           <a:p>
             <a:pPr algn="ctr" defTabSz="4389438"/>
             <a:r>
-              <a:rPr lang="en-US" sz="3200" dirty="0" smtClean="0">
+              <a:rPr lang="en-US" sz="3200" dirty="0" err="1" smtClean="0">
                 <a:latin typeface="Arial" charset="0"/>
               </a:rPr>
-              <a:t>Contours</a:t>
+              <a:t>Segment’n</a:t>
             </a:r>
             <a:endParaRPr lang="en-US" sz="3200" dirty="0">
               <a:latin typeface="Arial" charset="0"/>
@@ -4300,13 +4329,13 @@
       </p:sp>
       <p:sp>
         <p:nvSpPr>
-          <p:cNvPr id="65" name="Rectangle 64"/>
+          <p:cNvPr id="90" name="Rectangle 89"/>
           <p:cNvSpPr/>
           <p:nvPr/>
         </p:nvSpPr>
         <p:spPr bwMode="auto">
           <a:xfrm>
-            <a:off x="7467600" y="4762926"/>
+            <a:off x="7421562" y="5452695"/>
             <a:ext cx="2484276" cy="1054165"/>
           </a:xfrm>
           <a:prstGeom prst="rect">
@@ -4345,7 +4374,7 @@
               <a:rPr lang="en-US" sz="3200" dirty="0" smtClean="0">
                 <a:latin typeface="Arial" charset="0"/>
               </a:rPr>
-              <a:t>DICOM-RT Export</a:t>
+              <a:t>Ext. Beam Planning</a:t>
             </a:r>
             <a:endParaRPr lang="en-US" sz="3200" dirty="0">
               <a:latin typeface="Arial" charset="0"/>
@@ -4355,15 +4384,15 @@
       </p:sp>
       <p:cxnSp>
         <p:nvCxnSpPr>
-          <p:cNvPr id="66" name="Straight Arrow Connector 65"/>
+          <p:cNvPr id="91" name="Straight Arrow Connector 90"/>
           <p:cNvCxnSpPr>
-            <a:stCxn id="65" idx="3"/>
+            <a:stCxn id="90" idx="3"/>
           </p:cNvCxnSpPr>
           <p:nvPr/>
         </p:nvCxnSpPr>
         <p:spPr bwMode="auto">
           <a:xfrm flipV="1">
-            <a:off x="9951876" y="4501895"/>
+            <a:off x="9905838" y="5191664"/>
             <a:ext cx="702477" cy="788114"/>
           </a:xfrm>
           <a:prstGeom prst="straightConnector1">
@@ -4386,13 +4415,13 @@
       </p:cxnSp>
       <p:sp>
         <p:nvSpPr>
-          <p:cNvPr id="73" name="Rectangle 72"/>
+          <p:cNvPr id="92" name="Rectangle 91"/>
           <p:cNvSpPr/>
           <p:nvPr/>
         </p:nvSpPr>
         <p:spPr bwMode="auto">
           <a:xfrm>
-            <a:off x="7467600" y="6078121"/>
+            <a:off x="7421562" y="6767890"/>
             <a:ext cx="2484276" cy="649087"/>
           </a:xfrm>
           <a:prstGeom prst="rect">
@@ -4438,13 +4467,13 @@
       </p:sp>
       <p:sp>
         <p:nvSpPr>
-          <p:cNvPr id="88" name="Rectangle 87"/>
+          <p:cNvPr id="93" name="Rectangle 92"/>
           <p:cNvSpPr/>
           <p:nvPr/>
         </p:nvSpPr>
         <p:spPr>
           <a:xfrm>
-            <a:off x="10115264" y="5468593"/>
+            <a:off x="10069226" y="6158362"/>
             <a:ext cx="228600" cy="1475240"/>
           </a:xfrm>
           <a:prstGeom prst="rect">
@@ -4484,13 +4513,13 @@
       </p:sp>
       <p:sp>
         <p:nvSpPr>
-          <p:cNvPr id="78" name="Rectangle 77"/>
+          <p:cNvPr id="94" name="Rectangle 93"/>
           <p:cNvSpPr/>
           <p:nvPr/>
         </p:nvSpPr>
         <p:spPr bwMode="auto">
           <a:xfrm>
-            <a:off x="4890449" y="4325012"/>
+            <a:off x="4844411" y="5014781"/>
             <a:ext cx="2287979" cy="660801"/>
           </a:xfrm>
           <a:prstGeom prst="rect">
@@ -4539,13 +4568,13 @@
       </p:sp>
       <p:sp>
         <p:nvSpPr>
-          <p:cNvPr id="79" name="Rectangle 78"/>
+          <p:cNvPr id="95" name="Rectangle 94"/>
           <p:cNvSpPr/>
           <p:nvPr/>
         </p:nvSpPr>
         <p:spPr bwMode="auto">
           <a:xfrm>
-            <a:off x="4890449" y="5195709"/>
+            <a:off x="4844411" y="5885478"/>
             <a:ext cx="2287979" cy="660801"/>
           </a:xfrm>
           <a:prstGeom prst="rect">
@@ -4594,13 +4623,13 @@
       </p:sp>
       <p:sp>
         <p:nvSpPr>
-          <p:cNvPr id="80" name="Rectangle 79"/>
+          <p:cNvPr id="96" name="Rectangle 95"/>
           <p:cNvSpPr/>
           <p:nvPr/>
         </p:nvSpPr>
         <p:spPr bwMode="auto">
           <a:xfrm>
-            <a:off x="4890448" y="6066407"/>
+            <a:off x="4844410" y="6756176"/>
             <a:ext cx="2287979" cy="660801"/>
           </a:xfrm>
           <a:prstGeom prst="rect">
@@ -4636,7 +4665,7 @@
           <a:p>
             <a:pPr algn="ctr" defTabSz="4389438"/>
             <a:r>
-              <a:rPr lang="en-US" sz="3200" dirty="0" smtClean="0">
+              <a:rPr lang="en-US" sz="3200" smtClean="0">
                 <a:latin typeface="Arial" charset="0"/>
               </a:rPr>
               <a:t>…</a:t>
@@ -4649,13 +4678,13 @@
       </p:sp>
       <p:sp>
         <p:nvSpPr>
-          <p:cNvPr id="50" name="Rectangle 49"/>
+          <p:cNvPr id="97" name="Rectangle 96"/>
           <p:cNvSpPr/>
           <p:nvPr/>
         </p:nvSpPr>
         <p:spPr bwMode="auto">
           <a:xfrm>
-            <a:off x="10771496" y="5633088"/>
+            <a:off x="10725458" y="6322857"/>
             <a:ext cx="2623244" cy="1103220"/>
           </a:xfrm>
           <a:prstGeom prst="rect">
@@ -4700,7 +4729,7 @@
               <a:rPr lang="en-US" sz="3200" dirty="0" smtClean="0">
                 <a:latin typeface="Arial" charset="0"/>
               </a:rPr>
-              <a:t>Import</a:t>
+              <a:t>Import/export</a:t>
             </a:r>
             <a:endParaRPr lang="en-US" sz="3200" dirty="0">
               <a:latin typeface="Arial" charset="0"/>
@@ -4710,15 +4739,15 @@
       </p:sp>
       <p:cxnSp>
         <p:nvCxnSpPr>
-          <p:cNvPr id="48" name="Straight Arrow Connector 47"/>
+          <p:cNvPr id="98" name="Straight Arrow Connector 97"/>
           <p:cNvCxnSpPr>
-            <a:stCxn id="50" idx="2"/>
+            <a:stCxn id="97" idx="2"/>
           </p:cNvCxnSpPr>
           <p:nvPr/>
         </p:nvCxnSpPr>
         <p:spPr bwMode="auto">
           <a:xfrm>
-            <a:off x="12083118" y="6736308"/>
+            <a:off x="12037080" y="7426077"/>
             <a:ext cx="0" cy="1188492"/>
           </a:xfrm>
           <a:prstGeom prst="straightConnector1">
@@ -4741,16 +4770,393 @@
       </p:cxnSp>
       <p:cxnSp>
         <p:nvCxnSpPr>
-          <p:cNvPr id="74" name="Straight Arrow Connector 73"/>
+          <p:cNvPr id="99" name="Straight Arrow Connector 98"/>
           <p:cNvCxnSpPr>
-            <a:stCxn id="73" idx="3"/>
+            <a:stCxn id="92" idx="3"/>
           </p:cNvCxnSpPr>
           <p:nvPr/>
         </p:nvCxnSpPr>
         <p:spPr bwMode="auto">
           <a:xfrm flipV="1">
-            <a:off x="9951876" y="5151083"/>
+            <a:off x="9905838" y="5840852"/>
             <a:ext cx="702477" cy="1251582"/>
+          </a:xfrm>
+          <a:prstGeom prst="straightConnector1">
+            <a:avLst/>
+          </a:prstGeom>
+          <a:solidFill>
+            <a:schemeClr val="accent1"/>
+          </a:solidFill>
+          <a:ln w="38100" cap="flat" cmpd="sng" algn="ctr">
+            <a:solidFill>
+              <a:schemeClr val="tx1"/>
+            </a:solidFill>
+            <a:prstDash val="solid"/>
+            <a:round/>
+            <a:headEnd type="none" w="med" len="med"/>
+            <a:tailEnd type="arrow" w="lg" len="lg"/>
+          </a:ln>
+          <a:effectLst/>
+        </p:spPr>
+      </p:cxnSp>
+      <p:sp>
+        <p:nvSpPr>
+          <p:cNvPr id="101" name="Rectangle 100"/>
+          <p:cNvSpPr/>
+          <p:nvPr/>
+        </p:nvSpPr>
+        <p:spPr bwMode="auto">
+          <a:xfrm>
+            <a:off x="5726112" y="2232819"/>
+            <a:ext cx="3221905" cy="649087"/>
+          </a:xfrm>
+          <a:prstGeom prst="rect">
+            <a:avLst/>
+          </a:prstGeom>
+          <a:solidFill>
+            <a:srgbClr val="C5EDCF"/>
+          </a:solidFill>
+          <a:ln w="28575" cap="flat" cmpd="sng" algn="ctr">
+            <a:solidFill>
+              <a:schemeClr val="tx1"/>
+            </a:solidFill>
+            <a:prstDash val="solid"/>
+            <a:round/>
+            <a:headEnd type="none" w="med" len="med"/>
+            <a:tailEnd type="none" w="med" len="med"/>
+          </a:ln>
+          <a:effectLst>
+            <a:outerShdw blurRad="50800" dist="38100" dir="2700000" algn="tl" rotWithShape="0">
+              <a:prstClr val="black">
+                <a:alpha val="40000"/>
+              </a:prstClr>
+            </a:outerShdw>
+          </a:effectLst>
+        </p:spPr>
+        <p:txBody>
+          <a:bodyPr vert="horz" wrap="square" lIns="91440" tIns="45720" rIns="91440" bIns="45720" numCol="1" rtlCol="0" anchor="t" anchorCtr="0" compatLnSpc="1">
+            <a:prstTxWarp prst="textNoShape">
+              <a:avLst/>
+            </a:prstTxWarp>
+          </a:bodyPr>
+          <a:lstStyle/>
+          <a:p>
+            <a:pPr algn="ctr" defTabSz="4389438"/>
+            <a:r>
+              <a:rPr lang="en-US" sz="3200">
+                <a:latin typeface="Arial" charset="0"/>
+              </a:rPr>
+              <a:t>Gel </a:t>
+            </a:r>
+            <a:r>
+              <a:rPr lang="en-US" sz="3200" smtClean="0">
+                <a:latin typeface="Arial" charset="0"/>
+              </a:rPr>
+              <a:t>Dosimetry</a:t>
+            </a:r>
+            <a:endParaRPr lang="en-US" sz="3200" dirty="0">
+              <a:latin typeface="Arial" charset="0"/>
+            </a:endParaRPr>
+          </a:p>
+        </p:txBody>
+      </p:sp>
+      <p:cxnSp>
+        <p:nvCxnSpPr>
+          <p:cNvPr id="102" name="Straight Arrow Connector 101"/>
+          <p:cNvCxnSpPr>
+            <a:stCxn id="101" idx="2"/>
+          </p:cNvCxnSpPr>
+          <p:nvPr/>
+        </p:nvCxnSpPr>
+        <p:spPr bwMode="auto">
+          <a:xfrm>
+            <a:off x="7337065" y="2881906"/>
+            <a:ext cx="0" cy="500612"/>
+          </a:xfrm>
+          <a:prstGeom prst="straightConnector1">
+            <a:avLst/>
+          </a:prstGeom>
+          <a:solidFill>
+            <a:schemeClr val="accent1"/>
+          </a:solidFill>
+          <a:ln w="38100" cap="flat" cmpd="sng" algn="ctr">
+            <a:solidFill>
+              <a:schemeClr val="tx1"/>
+            </a:solidFill>
+            <a:prstDash val="solid"/>
+            <a:round/>
+            <a:headEnd type="none" w="med" len="med"/>
+            <a:tailEnd type="arrow" w="lg" len="lg"/>
+          </a:ln>
+          <a:effectLst/>
+        </p:spPr>
+      </p:cxnSp>
+      <p:sp>
+        <p:nvSpPr>
+          <p:cNvPr id="103" name="Rectangle 102"/>
+          <p:cNvSpPr/>
+          <p:nvPr/>
+        </p:nvSpPr>
+        <p:spPr bwMode="auto">
+          <a:xfrm>
+            <a:off x="6202362" y="10576025"/>
+            <a:ext cx="3082797" cy="649087"/>
+          </a:xfrm>
+          <a:prstGeom prst="rect">
+            <a:avLst/>
+          </a:prstGeom>
+          <a:solidFill>
+            <a:srgbClr val="C5EDCF"/>
+          </a:solidFill>
+          <a:ln w="28575" cap="flat" cmpd="sng" algn="ctr">
+            <a:solidFill>
+              <a:schemeClr val="tx1"/>
+            </a:solidFill>
+            <a:prstDash val="solid"/>
+            <a:round/>
+            <a:headEnd type="none" w="med" len="med"/>
+            <a:tailEnd type="none" w="med" len="med"/>
+          </a:ln>
+          <a:effectLst>
+            <a:outerShdw blurRad="50800" dist="38100" dir="2700000" algn="tl" rotWithShape="0">
+              <a:prstClr val="black">
+                <a:alpha val="40000"/>
+              </a:prstClr>
+            </a:outerShdw>
+          </a:effectLst>
+        </p:spPr>
+        <p:txBody>
+          <a:bodyPr vert="horz" wrap="square" lIns="91440" tIns="45720" rIns="91440" bIns="45720" numCol="1" rtlCol="0" anchor="t" anchorCtr="0" compatLnSpc="1">
+            <a:prstTxWarp prst="textNoShape">
+              <a:avLst/>
+            </a:prstTxWarp>
+          </a:bodyPr>
+          <a:lstStyle/>
+          <a:p>
+            <a:pPr algn="ctr" defTabSz="4389438"/>
+            <a:r>
+              <a:rPr lang="en-US" sz="3200" dirty="0" smtClean="0">
+                <a:latin typeface="Arial" charset="0"/>
+              </a:rPr>
+              <a:t>Sequences</a:t>
+            </a:r>
+            <a:endParaRPr lang="en-US" sz="3200" dirty="0">
+              <a:latin typeface="Arial" charset="0"/>
+            </a:endParaRPr>
+          </a:p>
+        </p:txBody>
+      </p:sp>
+      <p:sp>
+        <p:nvSpPr>
+          <p:cNvPr id="104" name="Rectangle 103"/>
+          <p:cNvSpPr/>
+          <p:nvPr/>
+        </p:nvSpPr>
+        <p:spPr bwMode="auto">
+          <a:xfrm>
+            <a:off x="10164762" y="10576025"/>
+            <a:ext cx="3082797" cy="649087"/>
+          </a:xfrm>
+          <a:prstGeom prst="rect">
+            <a:avLst/>
+          </a:prstGeom>
+          <a:solidFill>
+            <a:srgbClr val="C5EDCF"/>
+          </a:solidFill>
+          <a:ln w="28575" cap="flat" cmpd="sng" algn="ctr">
+            <a:solidFill>
+              <a:schemeClr val="tx1"/>
+            </a:solidFill>
+            <a:prstDash val="solid"/>
+            <a:round/>
+            <a:headEnd type="none" w="med" len="med"/>
+            <a:tailEnd type="none" w="med" len="med"/>
+          </a:ln>
+          <a:effectLst>
+            <a:outerShdw blurRad="50800" dist="38100" dir="2700000" algn="tl" rotWithShape="0">
+              <a:prstClr val="black">
+                <a:alpha val="40000"/>
+              </a:prstClr>
+            </a:outerShdw>
+          </a:effectLst>
+        </p:spPr>
+        <p:txBody>
+          <a:bodyPr vert="horz" wrap="square" lIns="91440" tIns="45720" rIns="91440" bIns="45720" numCol="1" rtlCol="0" anchor="t" anchorCtr="0" compatLnSpc="1">
+            <a:prstTxWarp prst="textNoShape">
+              <a:avLst/>
+            </a:prstTxWarp>
+          </a:bodyPr>
+          <a:lstStyle/>
+          <a:p>
+            <a:pPr algn="ctr" defTabSz="4389438"/>
+            <a:r>
+              <a:rPr lang="en-US" sz="3200" dirty="0" err="1">
+                <a:latin typeface="Arial" charset="0"/>
+              </a:rPr>
+              <a:t>Matlab</a:t>
+            </a:r>
+            <a:r>
+              <a:rPr lang="en-US" sz="3200" dirty="0">
+                <a:latin typeface="Arial" charset="0"/>
+              </a:rPr>
+              <a:t> Bridge</a:t>
+            </a:r>
+          </a:p>
+        </p:txBody>
+      </p:sp>
+      <p:sp>
+        <p:nvSpPr>
+          <p:cNvPr id="41" name="Rectangle 40"/>
+          <p:cNvSpPr/>
+          <p:nvPr/>
+        </p:nvSpPr>
+        <p:spPr bwMode="auto">
+          <a:xfrm>
+            <a:off x="529218" y="6802696"/>
+            <a:ext cx="2664296" cy="1224136"/>
+          </a:xfrm>
+          <a:prstGeom prst="rect">
+            <a:avLst/>
+          </a:prstGeom>
+          <a:solidFill>
+            <a:srgbClr val="FEDABA"/>
+          </a:solidFill>
+          <a:ln w="28575" cap="flat" cmpd="sng" algn="ctr">
+            <a:solidFill>
+              <a:schemeClr val="tx1"/>
+            </a:solidFill>
+            <a:prstDash val="solid"/>
+            <a:round/>
+            <a:headEnd type="none" w="med" len="med"/>
+            <a:tailEnd type="none" w="med" len="med"/>
+          </a:ln>
+          <a:effectLst>
+            <a:outerShdw blurRad="50800" dist="38100" dir="2700000" algn="tl" rotWithShape="0">
+              <a:prstClr val="black">
+                <a:alpha val="40000"/>
+              </a:prstClr>
+            </a:outerShdw>
+          </a:effectLst>
+        </p:spPr>
+        <p:txBody>
+          <a:bodyPr vert="horz" wrap="square" lIns="91440" tIns="45720" rIns="91440" bIns="45720" numCol="1" rtlCol="0" anchor="ctr" anchorCtr="0" compatLnSpc="1">
+            <a:prstTxWarp prst="textNoShape">
+              <a:avLst/>
+            </a:prstTxWarp>
+          </a:bodyPr>
+          <a:lstStyle/>
+          <a:p>
+            <a:pPr algn="ctr" defTabSz="4389438"/>
+            <a:r>
+              <a:rPr lang="en-US" sz="4800" smtClean="0">
+                <a:latin typeface="Arial" charset="0"/>
+              </a:rPr>
+              <a:t>Python</a:t>
+            </a:r>
+            <a:endParaRPr lang="en-US" sz="4800" dirty="0">
+              <a:latin typeface="Arial" charset="0"/>
+            </a:endParaRPr>
+          </a:p>
+        </p:txBody>
+      </p:sp>
+      <p:cxnSp>
+        <p:nvCxnSpPr>
+          <p:cNvPr id="42" name="Straight Arrow Connector 41"/>
+          <p:cNvCxnSpPr>
+            <a:endCxn id="41" idx="3"/>
+          </p:cNvCxnSpPr>
+          <p:nvPr/>
+        </p:nvCxnSpPr>
+        <p:spPr bwMode="auto">
+          <a:xfrm flipH="1">
+            <a:off x="3193514" y="7414764"/>
+            <a:ext cx="951448" cy="0"/>
+          </a:xfrm>
+          <a:prstGeom prst="straightConnector1">
+            <a:avLst/>
+          </a:prstGeom>
+          <a:solidFill>
+            <a:schemeClr val="accent1"/>
+          </a:solidFill>
+          <a:ln w="38100" cap="flat" cmpd="sng" algn="ctr">
+            <a:solidFill>
+              <a:schemeClr val="tx1"/>
+            </a:solidFill>
+            <a:prstDash val="solid"/>
+            <a:round/>
+            <a:headEnd type="none" w="med" len="med"/>
+            <a:tailEnd type="arrow" w="lg" len="lg"/>
+          </a:ln>
+          <a:effectLst/>
+        </p:spPr>
+      </p:cxnSp>
+      <p:sp>
+        <p:nvSpPr>
+          <p:cNvPr id="55" name="Rectangle 54"/>
+          <p:cNvSpPr/>
+          <p:nvPr/>
+        </p:nvSpPr>
+        <p:spPr bwMode="auto">
+          <a:xfrm>
+            <a:off x="9321738" y="2236788"/>
+            <a:ext cx="4374553" cy="649087"/>
+          </a:xfrm>
+          <a:prstGeom prst="rect">
+            <a:avLst/>
+          </a:prstGeom>
+          <a:solidFill>
+            <a:srgbClr val="C5EDCF"/>
+          </a:solidFill>
+          <a:ln w="28575" cap="flat" cmpd="sng" algn="ctr">
+            <a:solidFill>
+              <a:schemeClr val="tx1"/>
+            </a:solidFill>
+            <a:prstDash val="solid"/>
+            <a:round/>
+            <a:headEnd type="none" w="med" len="med"/>
+            <a:tailEnd type="none" w="med" len="med"/>
+          </a:ln>
+          <a:effectLst>
+            <a:outerShdw blurRad="50800" dist="38100" dir="2700000" algn="tl" rotWithShape="0">
+              <a:prstClr val="black">
+                <a:alpha val="40000"/>
+              </a:prstClr>
+            </a:outerShdw>
+          </a:effectLst>
+        </p:spPr>
+        <p:txBody>
+          <a:bodyPr vert="horz" wrap="square" lIns="91440" tIns="45720" rIns="91440" bIns="45720" numCol="1" rtlCol="0" anchor="t" anchorCtr="0" compatLnSpc="1">
+            <a:prstTxWarp prst="textNoShape">
+              <a:avLst/>
+            </a:prstTxWarp>
+          </a:bodyPr>
+          <a:lstStyle/>
+          <a:p>
+            <a:pPr algn="ctr" defTabSz="4389438"/>
+            <a:r>
+              <a:rPr lang="en-US" sz="3200" smtClean="0">
+                <a:latin typeface="Arial" charset="0"/>
+              </a:rPr>
+              <a:t>more end-user apps…</a:t>
+            </a:r>
+            <a:endParaRPr lang="en-US" sz="3200" dirty="0">
+              <a:latin typeface="Arial" charset="0"/>
+            </a:endParaRPr>
+          </a:p>
+        </p:txBody>
+      </p:sp>
+      <p:cxnSp>
+        <p:nvCxnSpPr>
+          <p:cNvPr id="56" name="Straight Arrow Connector 55"/>
+          <p:cNvCxnSpPr>
+            <a:stCxn id="55" idx="2"/>
+          </p:cNvCxnSpPr>
+          <p:nvPr/>
+        </p:nvCxnSpPr>
+        <p:spPr bwMode="auto">
+          <a:xfrm>
+            <a:off x="11509015" y="2885875"/>
+            <a:ext cx="0" cy="500612"/>
           </a:xfrm>
           <a:prstGeom prst="straightConnector1">
             <a:avLst/>
@@ -4783,7 +5189,7 @@
   <p:timing>
     <p:tnLst>
       <p:par>
-        <p:cTn id="1" dur="indefinite" restart="never" nodeType="tmRoot"/>
+        <p:cTn xmlns:p14="http://schemas.microsoft.com/office/powerpoint/2010/main" id="1" dur="indefinite" restart="never" nodeType="tmRoot"/>
       </p:par>
     </p:tnLst>
   </p:timing>

</xml_diff>